<commit_message>
add intro, J! archive, data collection, and mysql slides
</commit_message>
<xml_diff>
--- a/docs/Analyzing_Jeopardy_Data.pptx
+++ b/docs/Analyzing_Jeopardy_Data.pptx
@@ -6,12 +6,21 @@
   </p:sldMasterIdLst>
   <p:sldIdLst>
     <p:sldId id="256" r:id="rId2"/>
-    <p:sldId id="257" r:id="rId3"/>
-    <p:sldId id="258" r:id="rId4"/>
-    <p:sldId id="261" r:id="rId5"/>
-    <p:sldId id="260" r:id="rId6"/>
-    <p:sldId id="262" r:id="rId7"/>
-    <p:sldId id="259" r:id="rId8"/>
+    <p:sldId id="263" r:id="rId3"/>
+    <p:sldId id="264" r:id="rId4"/>
+    <p:sldId id="265" r:id="rId5"/>
+    <p:sldId id="266" r:id="rId6"/>
+    <p:sldId id="267" r:id="rId7"/>
+    <p:sldId id="268" r:id="rId8"/>
+    <p:sldId id="269" r:id="rId9"/>
+    <p:sldId id="270" r:id="rId10"/>
+    <p:sldId id="271" r:id="rId11"/>
+    <p:sldId id="257" r:id="rId12"/>
+    <p:sldId id="258" r:id="rId13"/>
+    <p:sldId id="261" r:id="rId14"/>
+    <p:sldId id="260" r:id="rId15"/>
+    <p:sldId id="262" r:id="rId16"/>
+    <p:sldId id="259" r:id="rId17"/>
   </p:sldIdLst>
   <p:sldSz cx="12192000" cy="6858000"/>
   <p:notesSz cx="6858000" cy="9144000"/>
@@ -363,7 +372,7 @@
           <a:p>
             <a:fld id="{1160EA64-D806-43AC-9DF2-F8C432F32B4C}" type="datetimeFigureOut">
               <a:rPr lang="en-US" smtClean="0"/>
-              <a:t>3/31/2021</a:t>
+              <a:t>4/2/21</a:t>
             </a:fld>
             <a:endParaRPr lang="en-US" dirty="0"/>
           </a:p>
@@ -626,7 +635,7 @@
           <a:p>
             <a:fld id="{E9F9C37B-1D36-470B-8223-D6C91242EC14}" type="datetimeFigureOut">
               <a:rPr lang="en-US" smtClean="0"/>
-              <a:t>3/31/2021</a:t>
+              <a:t>4/2/21</a:t>
             </a:fld>
             <a:endParaRPr lang="en-US" dirty="0"/>
           </a:p>
@@ -861,7 +870,7 @@
           <a:p>
             <a:fld id="{67C6F52A-A82B-47A2-A83A-8C4C91F2D59F}" type="datetimeFigureOut">
               <a:rPr lang="en-US" smtClean="0"/>
-              <a:t>3/31/2021</a:t>
+              <a:t>4/2/21</a:t>
             </a:fld>
             <a:endParaRPr lang="en-US" dirty="0"/>
           </a:p>
@@ -1101,7 +1110,7 @@
           <a:p>
             <a:fld id="{F070A7B3-6521-4DCA-87E5-044747A908C1}" type="datetimeFigureOut">
               <a:rPr lang="en-US" smtClean="0"/>
-              <a:t>3/31/2021</a:t>
+              <a:t>4/2/21</a:t>
             </a:fld>
             <a:endParaRPr lang="en-US" dirty="0"/>
           </a:p>
@@ -1409,7 +1418,7 @@
           <a:p>
             <a:fld id="{1160EA64-D806-43AC-9DF2-F8C432F32B4C}" type="datetimeFigureOut">
               <a:rPr lang="en-US" smtClean="0"/>
-              <a:t>3/31/2021</a:t>
+              <a:t>4/2/21</a:t>
             </a:fld>
             <a:endParaRPr lang="en-US" dirty="0"/>
           </a:p>
@@ -1712,7 +1721,7 @@
           <a:p>
             <a:fld id="{AB134690-1557-4C89-A502-4959FE7FAD70}" type="datetimeFigureOut">
               <a:rPr lang="en-US" smtClean="0"/>
-              <a:t>3/31/2021</a:t>
+              <a:t>4/2/21</a:t>
             </a:fld>
             <a:endParaRPr lang="en-US" dirty="0"/>
           </a:p>
@@ -2134,7 +2143,7 @@
           <a:p>
             <a:fld id="{1160EA64-D806-43AC-9DF2-F8C432F32B4C}" type="datetimeFigureOut">
               <a:rPr lang="en-US" smtClean="0"/>
-              <a:t>3/31/2021</a:t>
+              <a:t>4/2/21</a:t>
             </a:fld>
             <a:endParaRPr lang="en-US" dirty="0"/>
           </a:p>
@@ -2231,7 +2240,7 @@
           <a:p>
             <a:fld id="{E1037C31-9E7A-4F99-8774-A0E530DE1A42}" type="datetimeFigureOut">
               <a:rPr lang="en-US" smtClean="0"/>
-              <a:t>3/31/2021</a:t>
+              <a:t>4/2/21</a:t>
             </a:fld>
             <a:endParaRPr lang="en-US" dirty="0"/>
           </a:p>
@@ -2393,7 +2402,7 @@
           <a:p>
             <a:fld id="{C278504F-A551-4DE0-9316-4DCD1D8CC752}" type="datetimeFigureOut">
               <a:rPr lang="en-US" smtClean="0"/>
-              <a:t>3/31/2021</a:t>
+              <a:t>4/2/21</a:t>
             </a:fld>
             <a:endParaRPr lang="en-US" dirty="0"/>
           </a:p>
@@ -2771,7 +2780,7 @@
           <a:p>
             <a:fld id="{1160EA64-D806-43AC-9DF2-F8C432F32B4C}" type="datetimeFigureOut">
               <a:rPr lang="en-US" smtClean="0"/>
-              <a:t>3/31/2021</a:t>
+              <a:t>4/2/21</a:t>
             </a:fld>
             <a:endParaRPr lang="en-US" dirty="0"/>
           </a:p>
@@ -3062,7 +3071,7 @@
             <a:fld id="{1160EA64-D806-43AC-9DF2-F8C432F32B4C}" type="datetimeFigureOut">
               <a:rPr lang="en-US" smtClean="0"/>
               <a:pPr/>
-              <a:t>3/31/2021</a:t>
+              <a:t>4/2/21</a:t>
             </a:fld>
             <a:endParaRPr lang="en-US" dirty="0"/>
           </a:p>
@@ -3274,7 +3283,7 @@
           <a:p>
             <a:fld id="{1160EA64-D806-43AC-9DF2-F8C432F32B4C}" type="datetimeFigureOut">
               <a:rPr lang="en-US" smtClean="0"/>
-              <a:t>3/31/2021</a:t>
+              <a:t>4/2/21</a:t>
             </a:fld>
             <a:endParaRPr lang="en-US" dirty="0"/>
           </a:p>
@@ -4216,7 +4225,7 @@
 </p:sld>
 </file>
 
-<file path=ppt/slides/slide2.xml><?xml version="1.0" encoding="utf-8"?>
+<file path=ppt/slides/slide10.xml><?xml version="1.0" encoding="utf-8"?>
 <p:sld xmlns:a="http://schemas.openxmlformats.org/drawingml/2006/main" xmlns:r="http://schemas.openxmlformats.org/officeDocument/2006/relationships" xmlns:p="http://schemas.openxmlformats.org/presentationml/2006/main">
   <p:cSld>
     <p:spTree>
@@ -4235,10 +4244,10 @@
       </p:grpSpPr>
       <p:sp>
         <p:nvSpPr>
-          <p:cNvPr id="2" name="Title 1">
+          <p:cNvPr id="4" name="Title 3">
             <a:extLst>
               <a:ext uri="{FF2B5EF4-FFF2-40B4-BE49-F238E27FC236}">
-                <a16:creationId xmlns:a16="http://schemas.microsoft.com/office/drawing/2014/main" id="{A33C6C18-6156-47F2-B832-7CED41E2BAFB}"/>
+                <a16:creationId xmlns:a16="http://schemas.microsoft.com/office/drawing/2014/main" id="{C1FBBFF4-69D7-7648-8F57-5C73DAF9A1D1}"/>
               </a:ext>
             </a:extLst>
           </p:cNvPr>
@@ -4256,40 +4265,44 @@
           <a:p>
             <a:r>
               <a:rPr lang="en-US" dirty="0"/>
-              <a:t>Overview</a:t>
-            </a:r>
-          </a:p>
-        </p:txBody>
-      </p:sp>
-      <p:sp>
-        <p:nvSpPr>
-          <p:cNvPr id="3" name="Content Placeholder 2">
+              <a:t>EER Diagram</a:t>
+            </a:r>
+          </a:p>
+        </p:txBody>
+      </p:sp>
+      <p:pic>
+        <p:nvPicPr>
+          <p:cNvPr id="11" name="Content Placeholder 10">
             <a:extLst>
               <a:ext uri="{FF2B5EF4-FFF2-40B4-BE49-F238E27FC236}">
-                <a16:creationId xmlns:a16="http://schemas.microsoft.com/office/drawing/2014/main" id="{FF5CD599-B2A4-4166-84B4-0AC65964421B}"/>
+                <a16:creationId xmlns:a16="http://schemas.microsoft.com/office/drawing/2014/main" id="{8A9D2C77-334F-E940-A0A1-40D5C8C6E674}"/>
               </a:ext>
             </a:extLst>
           </p:cNvPr>
-          <p:cNvSpPr>
-            <a:spLocks noGrp="1"/>
-          </p:cNvSpPr>
+          <p:cNvPicPr>
+            <a:picLocks noGrp="1" noChangeAspect="1"/>
+          </p:cNvPicPr>
           <p:nvPr>
             <p:ph idx="1"/>
           </p:nvPr>
-        </p:nvSpPr>
-        <p:spPr/>
-        <p:txBody>
-          <a:bodyPr/>
-          <a:lstStyle/>
-          <a:p>
-            <a:endParaRPr lang="en-US"/>
-          </a:p>
-        </p:txBody>
-      </p:sp>
+        </p:nvPicPr>
+        <p:blipFill>
+          <a:blip r:embed="rId2"/>
+          <a:stretch>
+            <a:fillRect/>
+          </a:stretch>
+        </p:blipFill>
+        <p:spPr>
+          <a:xfrm>
+            <a:off x="2970037" y="1968574"/>
+            <a:ext cx="6251925" cy="4614824"/>
+          </a:xfrm>
+        </p:spPr>
+      </p:pic>
     </p:spTree>
     <p:extLst>
       <p:ext uri="{BB962C8B-B14F-4D97-AF65-F5344CB8AC3E}">
-        <p14:creationId xmlns:p14="http://schemas.microsoft.com/office/powerpoint/2010/main" val="563183322"/>
+        <p14:creationId xmlns:p14="http://schemas.microsoft.com/office/powerpoint/2010/main" val="1272043228"/>
       </p:ext>
     </p:extLst>
   </p:cSld>
@@ -4299,7 +4312,7 @@
 </p:sld>
 </file>
 
-<file path=ppt/slides/slide3.xml><?xml version="1.0" encoding="utf-8"?>
+<file path=ppt/slides/slide11.xml><?xml version="1.0" encoding="utf-8"?>
 <p:sld xmlns:a="http://schemas.openxmlformats.org/drawingml/2006/main" xmlns:r="http://schemas.openxmlformats.org/officeDocument/2006/relationships" xmlns:p="http://schemas.openxmlformats.org/presentationml/2006/main">
   <p:cSld>
     <p:spTree>
@@ -4321,6 +4334,89 @@
           <p:cNvPr id="2" name="Title 1">
             <a:extLst>
               <a:ext uri="{FF2B5EF4-FFF2-40B4-BE49-F238E27FC236}">
+                <a16:creationId xmlns:a16="http://schemas.microsoft.com/office/drawing/2014/main" id="{A33C6C18-6156-47F2-B832-7CED41E2BAFB}"/>
+              </a:ext>
+            </a:extLst>
+          </p:cNvPr>
+          <p:cNvSpPr>
+            <a:spLocks noGrp="1"/>
+          </p:cNvSpPr>
+          <p:nvPr>
+            <p:ph type="title"/>
+          </p:nvPr>
+        </p:nvSpPr>
+        <p:spPr/>
+        <p:txBody>
+          <a:bodyPr/>
+          <a:lstStyle/>
+          <a:p>
+            <a:r>
+              <a:rPr lang="en-US" dirty="0"/>
+              <a:t>Overview</a:t>
+            </a:r>
+          </a:p>
+        </p:txBody>
+      </p:sp>
+      <p:sp>
+        <p:nvSpPr>
+          <p:cNvPr id="7" name="Content Placeholder 6">
+            <a:extLst>
+              <a:ext uri="{FF2B5EF4-FFF2-40B4-BE49-F238E27FC236}">
+                <a16:creationId xmlns:a16="http://schemas.microsoft.com/office/drawing/2014/main" id="{20CA6A68-5E45-5842-8DED-E08976BCECEA}"/>
+              </a:ext>
+            </a:extLst>
+          </p:cNvPr>
+          <p:cNvSpPr>
+            <a:spLocks noGrp="1"/>
+          </p:cNvSpPr>
+          <p:nvPr>
+            <p:ph idx="1"/>
+          </p:nvPr>
+        </p:nvSpPr>
+        <p:spPr/>
+        <p:txBody>
+          <a:bodyPr/>
+          <a:lstStyle/>
+          <a:p>
+            <a:endParaRPr lang="en-US"/>
+          </a:p>
+        </p:txBody>
+      </p:sp>
+    </p:spTree>
+    <p:extLst>
+      <p:ext uri="{BB962C8B-B14F-4D97-AF65-F5344CB8AC3E}">
+        <p14:creationId xmlns:p14="http://schemas.microsoft.com/office/powerpoint/2010/main" val="563183322"/>
+      </p:ext>
+    </p:extLst>
+  </p:cSld>
+  <p:clrMapOvr>
+    <a:masterClrMapping/>
+  </p:clrMapOvr>
+</p:sld>
+</file>
+
+<file path=ppt/slides/slide12.xml><?xml version="1.0" encoding="utf-8"?>
+<p:sld xmlns:a="http://schemas.openxmlformats.org/drawingml/2006/main" xmlns:r="http://schemas.openxmlformats.org/officeDocument/2006/relationships" xmlns:p="http://schemas.openxmlformats.org/presentationml/2006/main">
+  <p:cSld>
+    <p:spTree>
+      <p:nvGrpSpPr>
+        <p:cNvPr id="1" name=""/>
+        <p:cNvGrpSpPr/>
+        <p:nvPr/>
+      </p:nvGrpSpPr>
+      <p:grpSpPr>
+        <a:xfrm>
+          <a:off x="0" y="0"/>
+          <a:ext cx="0" cy="0"/>
+          <a:chOff x="0" y="0"/>
+          <a:chExt cx="0" cy="0"/>
+        </a:xfrm>
+      </p:grpSpPr>
+      <p:sp>
+        <p:nvSpPr>
+          <p:cNvPr id="2" name="Title 1">
+            <a:extLst>
+              <a:ext uri="{FF2B5EF4-FFF2-40B4-BE49-F238E27FC236}">
                 <a16:creationId xmlns:a16="http://schemas.microsoft.com/office/drawing/2014/main" id="{A8195544-965A-44C7-8BC5-B489E8E98FD4}"/>
               </a:ext>
             </a:extLst>
@@ -4382,7 +4478,7 @@
 </p:sld>
 </file>
 
-<file path=ppt/slides/slide4.xml><?xml version="1.0" encoding="utf-8"?>
+<file path=ppt/slides/slide13.xml><?xml version="1.0" encoding="utf-8"?>
 <p:sld xmlns:a="http://schemas.openxmlformats.org/drawingml/2006/main" xmlns:r="http://schemas.openxmlformats.org/officeDocument/2006/relationships" xmlns:p="http://schemas.openxmlformats.org/presentationml/2006/main">
   <p:cSld>
     <p:spTree>
@@ -4468,7 +4564,7 @@
 </p:sld>
 </file>
 
-<file path=ppt/slides/slide5.xml><?xml version="1.0" encoding="utf-8"?>
+<file path=ppt/slides/slide14.xml><?xml version="1.0" encoding="utf-8"?>
 <p:sld xmlns:a="http://schemas.openxmlformats.org/drawingml/2006/main" xmlns:r="http://schemas.openxmlformats.org/officeDocument/2006/relationships" xmlns:p="http://schemas.openxmlformats.org/presentationml/2006/main">
   <p:cSld>
     <p:spTree>
@@ -5548,6 +5644,688 @@
 </p:sld>
 </file>
 
+<file path=ppt/slides/slide15.xml><?xml version="1.0" encoding="utf-8"?>
+<p:sld xmlns:a="http://schemas.openxmlformats.org/drawingml/2006/main" xmlns:r="http://schemas.openxmlformats.org/officeDocument/2006/relationships" xmlns:p="http://schemas.openxmlformats.org/presentationml/2006/main">
+  <p:cSld>
+    <p:spTree>
+      <p:nvGrpSpPr>
+        <p:cNvPr id="1" name=""/>
+        <p:cNvGrpSpPr/>
+        <p:nvPr/>
+      </p:nvGrpSpPr>
+      <p:grpSpPr>
+        <a:xfrm>
+          <a:off x="0" y="0"/>
+          <a:ext cx="0" cy="0"/>
+          <a:chOff x="0" y="0"/>
+          <a:chExt cx="0" cy="0"/>
+        </a:xfrm>
+      </p:grpSpPr>
+      <p:sp>
+        <p:nvSpPr>
+          <p:cNvPr id="5" name="Title 4">
+            <a:extLst>
+              <a:ext uri="{FF2B5EF4-FFF2-40B4-BE49-F238E27FC236}">
+                <a16:creationId xmlns:a16="http://schemas.microsoft.com/office/drawing/2014/main" id="{E8011BEF-FB34-4E07-AFC1-E2481C643109}"/>
+              </a:ext>
+            </a:extLst>
+          </p:cNvPr>
+          <p:cNvSpPr>
+            <a:spLocks noGrp="1"/>
+          </p:cNvSpPr>
+          <p:nvPr>
+            <p:ph type="title"/>
+          </p:nvPr>
+        </p:nvSpPr>
+        <p:spPr/>
+        <p:txBody>
+          <a:bodyPr/>
+          <a:lstStyle/>
+          <a:p>
+            <a:r>
+              <a:rPr lang="en-US" dirty="0"/>
+              <a:t>Player Stats</a:t>
+            </a:r>
+          </a:p>
+        </p:txBody>
+      </p:sp>
+      <p:sp>
+        <p:nvSpPr>
+          <p:cNvPr id="6" name="Content Placeholder 5">
+            <a:extLst>
+              <a:ext uri="{FF2B5EF4-FFF2-40B4-BE49-F238E27FC236}">
+                <a16:creationId xmlns:a16="http://schemas.microsoft.com/office/drawing/2014/main" id="{E270B4E1-B012-44AD-BF94-92607BFA9500}"/>
+              </a:ext>
+            </a:extLst>
+          </p:cNvPr>
+          <p:cNvSpPr>
+            <a:spLocks noGrp="1"/>
+          </p:cNvSpPr>
+          <p:nvPr>
+            <p:ph sz="half" idx="1"/>
+          </p:nvPr>
+        </p:nvSpPr>
+        <p:spPr/>
+        <p:txBody>
+          <a:bodyPr/>
+          <a:lstStyle/>
+          <a:p>
+            <a:endParaRPr lang="en-US" dirty="0"/>
+          </a:p>
+        </p:txBody>
+      </p:sp>
+      <p:sp>
+        <p:nvSpPr>
+          <p:cNvPr id="7" name="Content Placeholder 6">
+            <a:extLst>
+              <a:ext uri="{FF2B5EF4-FFF2-40B4-BE49-F238E27FC236}">
+                <a16:creationId xmlns:a16="http://schemas.microsoft.com/office/drawing/2014/main" id="{3FAA6E3A-CEA0-47A8-8AC1-56E4B141ECCE}"/>
+              </a:ext>
+            </a:extLst>
+          </p:cNvPr>
+          <p:cNvSpPr>
+            <a:spLocks noGrp="1"/>
+          </p:cNvSpPr>
+          <p:nvPr>
+            <p:ph sz="half" idx="2"/>
+          </p:nvPr>
+        </p:nvSpPr>
+        <p:spPr/>
+        <p:txBody>
+          <a:bodyPr/>
+          <a:lstStyle/>
+          <a:p>
+            <a:endParaRPr lang="en-US"/>
+          </a:p>
+        </p:txBody>
+      </p:sp>
+    </p:spTree>
+    <p:extLst>
+      <p:ext uri="{BB962C8B-B14F-4D97-AF65-F5344CB8AC3E}">
+        <p14:creationId xmlns:p14="http://schemas.microsoft.com/office/powerpoint/2010/main" val="946137557"/>
+      </p:ext>
+    </p:extLst>
+  </p:cSld>
+  <p:clrMapOvr>
+    <a:masterClrMapping/>
+  </p:clrMapOvr>
+</p:sld>
+</file>
+
+<file path=ppt/slides/slide16.xml><?xml version="1.0" encoding="utf-8"?>
+<p:sld xmlns:a="http://schemas.openxmlformats.org/drawingml/2006/main" xmlns:r="http://schemas.openxmlformats.org/officeDocument/2006/relationships" xmlns:p="http://schemas.openxmlformats.org/presentationml/2006/main">
+  <p:cSld>
+    <p:spTree>
+      <p:nvGrpSpPr>
+        <p:cNvPr id="1" name=""/>
+        <p:cNvGrpSpPr/>
+        <p:nvPr/>
+      </p:nvGrpSpPr>
+      <p:grpSpPr>
+        <a:xfrm>
+          <a:off x="0" y="0"/>
+          <a:ext cx="0" cy="0"/>
+          <a:chOff x="0" y="0"/>
+          <a:chExt cx="0" cy="0"/>
+        </a:xfrm>
+      </p:grpSpPr>
+      <p:sp>
+        <p:nvSpPr>
+          <p:cNvPr id="6" name="Title 5">
+            <a:extLst>
+              <a:ext uri="{FF2B5EF4-FFF2-40B4-BE49-F238E27FC236}">
+                <a16:creationId xmlns:a16="http://schemas.microsoft.com/office/drawing/2014/main" id="{D960A884-4CA9-48A2-BD43-5B87FB198078}"/>
+              </a:ext>
+            </a:extLst>
+          </p:cNvPr>
+          <p:cNvSpPr>
+            <a:spLocks noGrp="1"/>
+          </p:cNvSpPr>
+          <p:nvPr>
+            <p:ph type="title"/>
+          </p:nvPr>
+        </p:nvSpPr>
+        <p:spPr/>
+        <p:txBody>
+          <a:bodyPr/>
+          <a:lstStyle/>
+          <a:p>
+            <a:r>
+              <a:rPr lang="en-US" dirty="0" err="1"/>
+              <a:t>Rshiny</a:t>
+            </a:r>
+            <a:r>
+              <a:rPr lang="en-US" dirty="0"/>
+              <a:t> App Demo</a:t>
+            </a:r>
+          </a:p>
+        </p:txBody>
+      </p:sp>
+      <p:sp>
+        <p:nvSpPr>
+          <p:cNvPr id="8" name="Text Placeholder 7">
+            <a:extLst>
+              <a:ext uri="{FF2B5EF4-FFF2-40B4-BE49-F238E27FC236}">
+                <a16:creationId xmlns:a16="http://schemas.microsoft.com/office/drawing/2014/main" id="{8F299ED4-3F58-4AFD-AF4A-8575976C2822}"/>
+              </a:ext>
+            </a:extLst>
+          </p:cNvPr>
+          <p:cNvSpPr>
+            <a:spLocks noGrp="1"/>
+          </p:cNvSpPr>
+          <p:nvPr>
+            <p:ph type="body" idx="1"/>
+          </p:nvPr>
+        </p:nvSpPr>
+        <p:spPr/>
+        <p:txBody>
+          <a:bodyPr/>
+          <a:lstStyle/>
+          <a:p>
+            <a:endParaRPr lang="en-US"/>
+          </a:p>
+        </p:txBody>
+      </p:sp>
+    </p:spTree>
+    <p:extLst>
+      <p:ext uri="{BB962C8B-B14F-4D97-AF65-F5344CB8AC3E}">
+        <p14:creationId xmlns:p14="http://schemas.microsoft.com/office/powerpoint/2010/main" val="1619147207"/>
+      </p:ext>
+    </p:extLst>
+  </p:cSld>
+  <p:clrMapOvr>
+    <a:masterClrMapping/>
+  </p:clrMapOvr>
+</p:sld>
+</file>
+
+<file path=ppt/slides/slide2.xml><?xml version="1.0" encoding="utf-8"?>
+<p:sld xmlns:a="http://schemas.openxmlformats.org/drawingml/2006/main" xmlns:r="http://schemas.openxmlformats.org/officeDocument/2006/relationships" xmlns:p="http://schemas.openxmlformats.org/presentationml/2006/main">
+  <p:cSld>
+    <p:spTree>
+      <p:nvGrpSpPr>
+        <p:cNvPr id="1" name=""/>
+        <p:cNvGrpSpPr/>
+        <p:nvPr/>
+      </p:nvGrpSpPr>
+      <p:grpSpPr>
+        <a:xfrm>
+          <a:off x="0" y="0"/>
+          <a:ext cx="0" cy="0"/>
+          <a:chOff x="0" y="0"/>
+          <a:chExt cx="0" cy="0"/>
+        </a:xfrm>
+      </p:grpSpPr>
+      <p:pic>
+        <p:nvPicPr>
+          <p:cNvPr id="2" name="Picture 1">
+            <a:extLst>
+              <a:ext uri="{FF2B5EF4-FFF2-40B4-BE49-F238E27FC236}">
+                <a16:creationId xmlns:a16="http://schemas.microsoft.com/office/drawing/2014/main" id="{08972D63-4EE3-8649-9265-C9C6C6BD4DE5}"/>
+              </a:ext>
+            </a:extLst>
+          </p:cNvPr>
+          <p:cNvPicPr>
+            <a:picLocks noChangeAspect="1"/>
+          </p:cNvPicPr>
+          <p:nvPr/>
+        </p:nvPicPr>
+        <p:blipFill>
+          <a:blip r:embed="rId2"/>
+          <a:stretch>
+            <a:fillRect/>
+          </a:stretch>
+        </p:blipFill>
+        <p:spPr>
+          <a:xfrm>
+            <a:off x="2844800" y="1255919"/>
+            <a:ext cx="6502400" cy="1841500"/>
+          </a:xfrm>
+          <a:prstGeom prst="rect">
+            <a:avLst/>
+          </a:prstGeom>
+        </p:spPr>
+      </p:pic>
+      <p:sp>
+        <p:nvSpPr>
+          <p:cNvPr id="3" name="TextBox 2">
+            <a:extLst>
+              <a:ext uri="{FF2B5EF4-FFF2-40B4-BE49-F238E27FC236}">
+                <a16:creationId xmlns:a16="http://schemas.microsoft.com/office/drawing/2014/main" id="{11194A73-338B-B541-B6D1-1F5C523B701F}"/>
+              </a:ext>
+            </a:extLst>
+          </p:cNvPr>
+          <p:cNvSpPr txBox="1"/>
+          <p:nvPr/>
+        </p:nvSpPr>
+        <p:spPr>
+          <a:xfrm>
+            <a:off x="4253727" y="3760582"/>
+            <a:ext cx="3684546" cy="2121030"/>
+          </a:xfrm>
+          <a:prstGeom prst="rect">
+            <a:avLst/>
+          </a:prstGeom>
+          <a:noFill/>
+        </p:spPr>
+        <p:txBody>
+          <a:bodyPr wrap="square" rtlCol="0">
+            <a:spAutoFit/>
+          </a:bodyPr>
+          <a:lstStyle/>
+          <a:p>
+            <a:pPr algn="ctr">
+              <a:lnSpc>
+                <a:spcPct val="150000"/>
+              </a:lnSpc>
+            </a:pPr>
+            <a:r>
+              <a:rPr lang="en-US" dirty="0"/>
+              <a:t>What is a game show that has been on the air for more than 37 years and is known for its late, beloved host and having players answer clues in the form of a question?</a:t>
+            </a:r>
+          </a:p>
+        </p:txBody>
+      </p:sp>
+    </p:spTree>
+    <p:extLst>
+      <p:ext uri="{BB962C8B-B14F-4D97-AF65-F5344CB8AC3E}">
+        <p14:creationId xmlns:p14="http://schemas.microsoft.com/office/powerpoint/2010/main" val="68740798"/>
+      </p:ext>
+    </p:extLst>
+  </p:cSld>
+  <p:clrMapOvr>
+    <a:masterClrMapping/>
+  </p:clrMapOvr>
+</p:sld>
+</file>
+
+<file path=ppt/slides/slide3.xml><?xml version="1.0" encoding="utf-8"?>
+<p:sld xmlns:a="http://schemas.openxmlformats.org/drawingml/2006/main" xmlns:r="http://schemas.openxmlformats.org/officeDocument/2006/relationships" xmlns:p="http://schemas.openxmlformats.org/presentationml/2006/main">
+  <p:cSld>
+    <p:spTree>
+      <p:nvGrpSpPr>
+        <p:cNvPr id="1" name=""/>
+        <p:cNvGrpSpPr/>
+        <p:nvPr/>
+      </p:nvGrpSpPr>
+      <p:grpSpPr>
+        <a:xfrm>
+          <a:off x="0" y="0"/>
+          <a:ext cx="0" cy="0"/>
+          <a:chOff x="0" y="0"/>
+          <a:chExt cx="0" cy="0"/>
+        </a:xfrm>
+      </p:grpSpPr>
+      <p:sp>
+        <p:nvSpPr>
+          <p:cNvPr id="2" name="Title 1">
+            <a:extLst>
+              <a:ext uri="{FF2B5EF4-FFF2-40B4-BE49-F238E27FC236}">
+                <a16:creationId xmlns:a16="http://schemas.microsoft.com/office/drawing/2014/main" id="{CE185C59-5A0C-704D-9826-D112A5672049}"/>
+              </a:ext>
+            </a:extLst>
+          </p:cNvPr>
+          <p:cNvSpPr>
+            <a:spLocks noGrp="1"/>
+          </p:cNvSpPr>
+          <p:nvPr>
+            <p:ph type="title"/>
+          </p:nvPr>
+        </p:nvSpPr>
+        <p:spPr/>
+        <p:txBody>
+          <a:bodyPr/>
+          <a:lstStyle/>
+          <a:p>
+            <a:r>
+              <a:rPr lang="en-US" dirty="0"/>
+              <a:t>J! Archive</a:t>
+            </a:r>
+          </a:p>
+        </p:txBody>
+      </p:sp>
+      <p:sp>
+        <p:nvSpPr>
+          <p:cNvPr id="3" name="Text Placeholder 2">
+            <a:extLst>
+              <a:ext uri="{FF2B5EF4-FFF2-40B4-BE49-F238E27FC236}">
+                <a16:creationId xmlns:a16="http://schemas.microsoft.com/office/drawing/2014/main" id="{F7C1B740-7BD6-CF44-A341-FC7FA30025D3}"/>
+              </a:ext>
+            </a:extLst>
+          </p:cNvPr>
+          <p:cNvSpPr>
+            <a:spLocks noGrp="1"/>
+          </p:cNvSpPr>
+          <p:nvPr>
+            <p:ph type="body" idx="1"/>
+          </p:nvPr>
+        </p:nvSpPr>
+        <p:spPr/>
+        <p:txBody>
+          <a:bodyPr/>
+          <a:lstStyle/>
+          <a:p>
+            <a:r>
+              <a:rPr lang="en-US" dirty="0"/>
+              <a:t>A fan-created archive of Jeopardy! Games and players</a:t>
+            </a:r>
+          </a:p>
+        </p:txBody>
+      </p:sp>
+    </p:spTree>
+    <p:extLst>
+      <p:ext uri="{BB962C8B-B14F-4D97-AF65-F5344CB8AC3E}">
+        <p14:creationId xmlns:p14="http://schemas.microsoft.com/office/powerpoint/2010/main" val="4152766938"/>
+      </p:ext>
+    </p:extLst>
+  </p:cSld>
+  <p:clrMapOvr>
+    <a:masterClrMapping/>
+  </p:clrMapOvr>
+</p:sld>
+</file>
+
+<file path=ppt/slides/slide4.xml><?xml version="1.0" encoding="utf-8"?>
+<p:sld xmlns:a="http://schemas.openxmlformats.org/drawingml/2006/main" xmlns:r="http://schemas.openxmlformats.org/officeDocument/2006/relationships" xmlns:p="http://schemas.openxmlformats.org/presentationml/2006/main">
+  <p:cSld>
+    <p:spTree>
+      <p:nvGrpSpPr>
+        <p:cNvPr id="1" name=""/>
+        <p:cNvGrpSpPr/>
+        <p:nvPr/>
+      </p:nvGrpSpPr>
+      <p:grpSpPr>
+        <a:xfrm>
+          <a:off x="0" y="0"/>
+          <a:ext cx="0" cy="0"/>
+          <a:chOff x="0" y="0"/>
+          <a:chExt cx="0" cy="0"/>
+        </a:xfrm>
+      </p:grpSpPr>
+      <p:sp>
+        <p:nvSpPr>
+          <p:cNvPr id="20" name="Title 19">
+            <a:extLst>
+              <a:ext uri="{FF2B5EF4-FFF2-40B4-BE49-F238E27FC236}">
+                <a16:creationId xmlns:a16="http://schemas.microsoft.com/office/drawing/2014/main" id="{BC09D4CA-BF58-A343-AC6A-7A901AE14762}"/>
+              </a:ext>
+            </a:extLst>
+          </p:cNvPr>
+          <p:cNvSpPr>
+            <a:spLocks noGrp="1"/>
+          </p:cNvSpPr>
+          <p:nvPr>
+            <p:ph type="title"/>
+          </p:nvPr>
+        </p:nvSpPr>
+        <p:spPr/>
+        <p:txBody>
+          <a:bodyPr/>
+          <a:lstStyle/>
+          <a:p>
+            <a:r>
+              <a:rPr lang="en-US" dirty="0"/>
+              <a:t>J! Archive</a:t>
+            </a:r>
+          </a:p>
+        </p:txBody>
+      </p:sp>
+      <p:pic>
+        <p:nvPicPr>
+          <p:cNvPr id="15" name="Content Placeholder 14">
+            <a:extLst>
+              <a:ext uri="{FF2B5EF4-FFF2-40B4-BE49-F238E27FC236}">
+                <a16:creationId xmlns:a16="http://schemas.microsoft.com/office/drawing/2014/main" id="{2C6294CB-3355-7D4D-AB87-B3869708949A}"/>
+              </a:ext>
+            </a:extLst>
+          </p:cNvPr>
+          <p:cNvPicPr>
+            <a:picLocks noGrp="1" noChangeAspect="1"/>
+          </p:cNvPicPr>
+          <p:nvPr>
+            <p:ph idx="1"/>
+          </p:nvPr>
+        </p:nvPicPr>
+        <p:blipFill>
+          <a:blip r:embed="rId2"/>
+          <a:stretch>
+            <a:fillRect/>
+          </a:stretch>
+        </p:blipFill>
+        <p:spPr>
+          <a:xfrm>
+            <a:off x="4007612" y="2181225"/>
+            <a:ext cx="4176776" cy="3678238"/>
+          </a:xfrm>
+        </p:spPr>
+      </p:pic>
+    </p:spTree>
+    <p:extLst>
+      <p:ext uri="{BB962C8B-B14F-4D97-AF65-F5344CB8AC3E}">
+        <p14:creationId xmlns:p14="http://schemas.microsoft.com/office/powerpoint/2010/main" val="853078615"/>
+      </p:ext>
+    </p:extLst>
+  </p:cSld>
+  <p:clrMapOvr>
+    <a:masterClrMapping/>
+  </p:clrMapOvr>
+</p:sld>
+</file>
+
+<file path=ppt/slides/slide5.xml><?xml version="1.0" encoding="utf-8"?>
+<p:sld xmlns:a="http://schemas.openxmlformats.org/drawingml/2006/main" xmlns:r="http://schemas.openxmlformats.org/officeDocument/2006/relationships" xmlns:p="http://schemas.openxmlformats.org/presentationml/2006/main">
+  <p:cSld>
+    <p:spTree>
+      <p:nvGrpSpPr>
+        <p:cNvPr id="1" name=""/>
+        <p:cNvGrpSpPr/>
+        <p:nvPr/>
+      </p:nvGrpSpPr>
+      <p:grpSpPr>
+        <a:xfrm>
+          <a:off x="0" y="0"/>
+          <a:ext cx="0" cy="0"/>
+          <a:chOff x="0" y="0"/>
+          <a:chExt cx="0" cy="0"/>
+        </a:xfrm>
+      </p:grpSpPr>
+      <p:pic>
+        <p:nvPicPr>
+          <p:cNvPr id="8" name="Content Placeholder 7">
+            <a:extLst>
+              <a:ext uri="{FF2B5EF4-FFF2-40B4-BE49-F238E27FC236}">
+                <a16:creationId xmlns:a16="http://schemas.microsoft.com/office/drawing/2014/main" id="{5FF13D94-5AA7-5E4B-9658-42E27F1CCBA9}"/>
+              </a:ext>
+            </a:extLst>
+          </p:cNvPr>
+          <p:cNvPicPr>
+            <a:picLocks noGrp="1" noChangeAspect="1"/>
+          </p:cNvPicPr>
+          <p:nvPr>
+            <p:ph sz="half" idx="4294967295"/>
+          </p:nvPr>
+        </p:nvPicPr>
+        <p:blipFill>
+          <a:blip r:embed="rId2"/>
+          <a:stretch>
+            <a:fillRect/>
+          </a:stretch>
+        </p:blipFill>
+        <p:spPr>
+          <a:xfrm>
+            <a:off x="6020419" y="646181"/>
+            <a:ext cx="5754138" cy="6082610"/>
+          </a:xfrm>
+        </p:spPr>
+      </p:pic>
+      <p:sp>
+        <p:nvSpPr>
+          <p:cNvPr id="9" name="TextBox 8">
+            <a:extLst>
+              <a:ext uri="{FF2B5EF4-FFF2-40B4-BE49-F238E27FC236}">
+                <a16:creationId xmlns:a16="http://schemas.microsoft.com/office/drawing/2014/main" id="{ABD11166-CE6A-6E40-B1A5-BC0D8380649A}"/>
+              </a:ext>
+            </a:extLst>
+          </p:cNvPr>
+          <p:cNvSpPr txBox="1"/>
+          <p:nvPr/>
+        </p:nvSpPr>
+        <p:spPr>
+          <a:xfrm>
+            <a:off x="669851" y="966922"/>
+            <a:ext cx="3376437" cy="461665"/>
+          </a:xfrm>
+          <a:prstGeom prst="rect">
+            <a:avLst/>
+          </a:prstGeom>
+          <a:noFill/>
+        </p:spPr>
+        <p:txBody>
+          <a:bodyPr wrap="none" rtlCol="0">
+            <a:spAutoFit/>
+          </a:bodyPr>
+          <a:lstStyle/>
+          <a:p>
+            <a:r>
+              <a:rPr lang="en-US" sz="2400" b="1" dirty="0"/>
+              <a:t>Information Collected</a:t>
+            </a:r>
+          </a:p>
+        </p:txBody>
+      </p:sp>
+      <p:sp>
+        <p:nvSpPr>
+          <p:cNvPr id="10" name="TextBox 9">
+            <a:extLst>
+              <a:ext uri="{FF2B5EF4-FFF2-40B4-BE49-F238E27FC236}">
+                <a16:creationId xmlns:a16="http://schemas.microsoft.com/office/drawing/2014/main" id="{B138C6BF-4D2F-6F42-A940-8D8542A742F7}"/>
+              </a:ext>
+            </a:extLst>
+          </p:cNvPr>
+          <p:cNvSpPr txBox="1"/>
+          <p:nvPr/>
+        </p:nvSpPr>
+        <p:spPr>
+          <a:xfrm>
+            <a:off x="1073889" y="1552354"/>
+            <a:ext cx="1790234" cy="2952027"/>
+          </a:xfrm>
+          <a:prstGeom prst="rect">
+            <a:avLst/>
+          </a:prstGeom>
+          <a:noFill/>
+        </p:spPr>
+        <p:txBody>
+          <a:bodyPr wrap="none" rtlCol="0">
+            <a:spAutoFit/>
+          </a:bodyPr>
+          <a:lstStyle/>
+          <a:p>
+            <a:pPr marL="285750" indent="-285750">
+              <a:lnSpc>
+                <a:spcPct val="150000"/>
+              </a:lnSpc>
+              <a:buFont typeface="Arial" panose="020B0604020202020204" pitchFamily="34" charset="0"/>
+              <a:buChar char="•"/>
+            </a:pPr>
+            <a:r>
+              <a:rPr lang="en-US" dirty="0"/>
+              <a:t>Air Date</a:t>
+            </a:r>
+          </a:p>
+          <a:p>
+            <a:pPr marL="285750" indent="-285750">
+              <a:lnSpc>
+                <a:spcPct val="150000"/>
+              </a:lnSpc>
+              <a:buFont typeface="Arial" panose="020B0604020202020204" pitchFamily="34" charset="0"/>
+              <a:buChar char="•"/>
+            </a:pPr>
+            <a:r>
+              <a:rPr lang="en-US" dirty="0"/>
+              <a:t>Contestants</a:t>
+            </a:r>
+          </a:p>
+          <a:p>
+            <a:pPr marL="285750" indent="-285750">
+              <a:lnSpc>
+                <a:spcPct val="150000"/>
+              </a:lnSpc>
+              <a:buFont typeface="Arial" panose="020B0604020202020204" pitchFamily="34" charset="0"/>
+              <a:buChar char="•"/>
+            </a:pPr>
+            <a:r>
+              <a:rPr lang="en-US" dirty="0"/>
+              <a:t>Categories</a:t>
+            </a:r>
+          </a:p>
+          <a:p>
+            <a:pPr marL="285750" indent="-285750">
+              <a:lnSpc>
+                <a:spcPct val="150000"/>
+              </a:lnSpc>
+              <a:buFont typeface="Arial" panose="020B0604020202020204" pitchFamily="34" charset="0"/>
+              <a:buChar char="•"/>
+            </a:pPr>
+            <a:r>
+              <a:rPr lang="en-US" dirty="0"/>
+              <a:t>Clues</a:t>
+            </a:r>
+          </a:p>
+          <a:p>
+            <a:pPr marL="285750" indent="-285750">
+              <a:lnSpc>
+                <a:spcPct val="150000"/>
+              </a:lnSpc>
+              <a:buFont typeface="Arial" panose="020B0604020202020204" pitchFamily="34" charset="0"/>
+              <a:buChar char="•"/>
+            </a:pPr>
+            <a:r>
+              <a:rPr lang="en-US" dirty="0"/>
+              <a:t>Responses</a:t>
+            </a:r>
+          </a:p>
+          <a:p>
+            <a:pPr marL="285750" indent="-285750">
+              <a:lnSpc>
+                <a:spcPct val="150000"/>
+              </a:lnSpc>
+              <a:buFont typeface="Arial" panose="020B0604020202020204" pitchFamily="34" charset="0"/>
+              <a:buChar char="•"/>
+            </a:pPr>
+            <a:r>
+              <a:rPr lang="en-US" dirty="0"/>
+              <a:t>Daily Doubles</a:t>
+            </a:r>
+          </a:p>
+          <a:p>
+            <a:pPr marL="285750" indent="-285750">
+              <a:lnSpc>
+                <a:spcPct val="150000"/>
+              </a:lnSpc>
+              <a:buFont typeface="Arial" panose="020B0604020202020204" pitchFamily="34" charset="0"/>
+              <a:buChar char="•"/>
+            </a:pPr>
+            <a:r>
+              <a:rPr lang="en-US" dirty="0"/>
+              <a:t>Final Scores</a:t>
+            </a:r>
+          </a:p>
+        </p:txBody>
+      </p:sp>
+    </p:spTree>
+    <p:extLst>
+      <p:ext uri="{BB962C8B-B14F-4D97-AF65-F5344CB8AC3E}">
+        <p14:creationId xmlns:p14="http://schemas.microsoft.com/office/powerpoint/2010/main" val="1795762231"/>
+      </p:ext>
+    </p:extLst>
+  </p:cSld>
+  <p:clrMapOvr>
+    <a:masterClrMapping/>
+  </p:clrMapOvr>
+</p:sld>
+</file>
+
 <file path=ppt/slides/slide6.xml><?xml version="1.0" encoding="utf-8"?>
 <p:sld xmlns:a="http://schemas.openxmlformats.org/drawingml/2006/main" xmlns:r="http://schemas.openxmlformats.org/officeDocument/2006/relationships" xmlns:p="http://schemas.openxmlformats.org/presentationml/2006/main">
   <p:cSld>
@@ -5567,10 +6345,10 @@
       </p:grpSpPr>
       <p:sp>
         <p:nvSpPr>
-          <p:cNvPr id="5" name="Title 4">
+          <p:cNvPr id="4" name="Title 3">
             <a:extLst>
               <a:ext uri="{FF2B5EF4-FFF2-40B4-BE49-F238E27FC236}">
-                <a16:creationId xmlns:a16="http://schemas.microsoft.com/office/drawing/2014/main" id="{E8011BEF-FB34-4E07-AFC1-E2481C643109}"/>
+                <a16:creationId xmlns:a16="http://schemas.microsoft.com/office/drawing/2014/main" id="{BF7448CE-C9E0-3844-8A12-9F553EA03726}"/>
               </a:ext>
             </a:extLst>
           </p:cNvPr>
@@ -5588,17 +6366,17 @@
           <a:p>
             <a:r>
               <a:rPr lang="en-US" dirty="0"/>
-              <a:t>Player Stats</a:t>
-            </a:r>
-          </a:p>
-        </p:txBody>
-      </p:sp>
-      <p:sp>
-        <p:nvSpPr>
-          <p:cNvPr id="6" name="Content Placeholder 5">
+              <a:t>Data Collection</a:t>
+            </a:r>
+          </a:p>
+        </p:txBody>
+      </p:sp>
+      <p:sp>
+        <p:nvSpPr>
+          <p:cNvPr id="5" name="Text Placeholder 4">
             <a:extLst>
               <a:ext uri="{FF2B5EF4-FFF2-40B4-BE49-F238E27FC236}">
-                <a16:creationId xmlns:a16="http://schemas.microsoft.com/office/drawing/2014/main" id="{E270B4E1-B012-44AD-BF94-92607BFA9500}"/>
+                <a16:creationId xmlns:a16="http://schemas.microsoft.com/office/drawing/2014/main" id="{93A016AD-31C9-7B49-BD82-2A1396832011}"/>
               </a:ext>
             </a:extLst>
           </p:cNvPr>
@@ -5606,7 +6384,7 @@
             <a:spLocks noGrp="1"/>
           </p:cNvSpPr>
           <p:nvPr>
-            <p:ph sz="half" idx="1"/>
+            <p:ph type="body" idx="1"/>
           </p:nvPr>
         </p:nvSpPr>
         <p:spPr/>
@@ -5614,39 +6392,21 @@
           <a:bodyPr/>
           <a:lstStyle/>
           <a:p>
-            <a:endParaRPr lang="en-US" dirty="0"/>
-          </a:p>
-        </p:txBody>
-      </p:sp>
-      <p:sp>
-        <p:nvSpPr>
-          <p:cNvPr id="7" name="Content Placeholder 6">
-            <a:extLst>
-              <a:ext uri="{FF2B5EF4-FFF2-40B4-BE49-F238E27FC236}">
-                <a16:creationId xmlns:a16="http://schemas.microsoft.com/office/drawing/2014/main" id="{3FAA6E3A-CEA0-47A8-8AC1-56E4B141ECCE}"/>
-              </a:ext>
-            </a:extLst>
-          </p:cNvPr>
-          <p:cNvSpPr>
-            <a:spLocks noGrp="1"/>
-          </p:cNvSpPr>
-          <p:nvPr>
-            <p:ph sz="half" idx="2"/>
-          </p:nvPr>
-        </p:nvSpPr>
-        <p:spPr/>
-        <p:txBody>
-          <a:bodyPr/>
-          <a:lstStyle/>
-          <a:p>
-            <a:endParaRPr lang="en-US"/>
+            <a:r>
+              <a:rPr lang="en-US" dirty="0" err="1"/>
+              <a:t>Whatr</a:t>
+            </a:r>
+            <a:r>
+              <a:rPr lang="en-US" dirty="0"/>
+              <a:t> package</a:t>
+            </a:r>
           </a:p>
         </p:txBody>
       </p:sp>
     </p:spTree>
     <p:extLst>
       <p:ext uri="{BB962C8B-B14F-4D97-AF65-F5344CB8AC3E}">
-        <p14:creationId xmlns:p14="http://schemas.microsoft.com/office/powerpoint/2010/main" val="946137557"/>
+        <p14:creationId xmlns:p14="http://schemas.microsoft.com/office/powerpoint/2010/main" val="3139486486"/>
       </p:ext>
     </p:extLst>
   </p:cSld>
@@ -5675,10 +6435,10 @@
       </p:grpSpPr>
       <p:sp>
         <p:nvSpPr>
-          <p:cNvPr id="6" name="Title 5">
+          <p:cNvPr id="4" name="Title 3">
             <a:extLst>
               <a:ext uri="{FF2B5EF4-FFF2-40B4-BE49-F238E27FC236}">
-                <a16:creationId xmlns:a16="http://schemas.microsoft.com/office/drawing/2014/main" id="{D960A884-4CA9-48A2-BD43-5B87FB198078}"/>
+                <a16:creationId xmlns:a16="http://schemas.microsoft.com/office/drawing/2014/main" id="{58EE9EB7-80CA-6942-B96C-134678246EC6}"/>
               </a:ext>
             </a:extLst>
           </p:cNvPr>
@@ -5695,22 +6455,18 @@
           <a:lstStyle/>
           <a:p>
             <a:r>
-              <a:rPr lang="en-US" dirty="0" err="1"/>
-              <a:t>Rshiny</a:t>
-            </a:r>
-            <a:r>
               <a:rPr lang="en-US" dirty="0"/>
-              <a:t> App Demo</a:t>
-            </a:r>
-          </a:p>
-        </p:txBody>
-      </p:sp>
-      <p:sp>
-        <p:nvSpPr>
-          <p:cNvPr id="8" name="Text Placeholder 7">
+              <a:t>Data Collection</a:t>
+            </a:r>
+          </a:p>
+        </p:txBody>
+      </p:sp>
+      <p:sp>
+        <p:nvSpPr>
+          <p:cNvPr id="5" name="Content Placeholder 4">
             <a:extLst>
               <a:ext uri="{FF2B5EF4-FFF2-40B4-BE49-F238E27FC236}">
-                <a16:creationId xmlns:a16="http://schemas.microsoft.com/office/drawing/2014/main" id="{8F299ED4-3F58-4AFD-AF4A-8575976C2822}"/>
+                <a16:creationId xmlns:a16="http://schemas.microsoft.com/office/drawing/2014/main" id="{3431542B-A159-6849-B550-4CB7688A04F2}"/>
               </a:ext>
             </a:extLst>
           </p:cNvPr>
@@ -5718,7 +6474,7 @@
             <a:spLocks noGrp="1"/>
           </p:cNvSpPr>
           <p:nvPr>
-            <p:ph type="body" idx="1"/>
+            <p:ph sz="half" idx="1"/>
           </p:nvPr>
         </p:nvSpPr>
         <p:spPr/>
@@ -5726,14 +6482,282 @@
           <a:bodyPr/>
           <a:lstStyle/>
           <a:p>
-            <a:endParaRPr lang="en-US"/>
-          </a:p>
-        </p:txBody>
-      </p:sp>
+            <a:r>
+              <a:rPr lang="en-US" dirty="0" err="1"/>
+              <a:t>whatr</a:t>
+            </a:r>
+            <a:r>
+              <a:rPr lang="en-US" dirty="0"/>
+              <a:t> package developed by </a:t>
+            </a:r>
+            <a:r>
+              <a:rPr lang="en-US" dirty="0" err="1"/>
+              <a:t>Kiernann</a:t>
+            </a:r>
+            <a:r>
+              <a:rPr lang="en-US" dirty="0"/>
+              <a:t> Nicholls</a:t>
+            </a:r>
+          </a:p>
+          <a:p>
+            <a:r>
+              <a:rPr lang="en-US" dirty="0"/>
+              <a:t>Created a function to get all details for a specific game ID</a:t>
+            </a:r>
+          </a:p>
+          <a:p>
+            <a:r>
+              <a:rPr lang="en-US" dirty="0"/>
+              <a:t>Used </a:t>
+            </a:r>
+            <a:r>
+              <a:rPr lang="en-US" dirty="0" err="1"/>
+              <a:t>purrr</a:t>
+            </a:r>
+            <a:r>
+              <a:rPr lang="en-US" dirty="0"/>
+              <a:t> to iterate over all of the games and create a master list</a:t>
+            </a:r>
+          </a:p>
+        </p:txBody>
+      </p:sp>
+      <p:pic>
+        <p:nvPicPr>
+          <p:cNvPr id="14" name="Content Placeholder 13">
+            <a:extLst>
+              <a:ext uri="{FF2B5EF4-FFF2-40B4-BE49-F238E27FC236}">
+                <a16:creationId xmlns:a16="http://schemas.microsoft.com/office/drawing/2014/main" id="{908E545B-5377-2743-9521-0455F88392C6}"/>
+              </a:ext>
+            </a:extLst>
+          </p:cNvPr>
+          <p:cNvPicPr>
+            <a:picLocks noGrp="1" noChangeAspect="1"/>
+          </p:cNvPicPr>
+          <p:nvPr>
+            <p:ph sz="half" idx="2"/>
+          </p:nvPr>
+        </p:nvPicPr>
+        <p:blipFill>
+          <a:blip r:embed="rId2"/>
+          <a:stretch>
+            <a:fillRect/>
+          </a:stretch>
+        </p:blipFill>
+        <p:spPr>
+          <a:xfrm>
+            <a:off x="6327775" y="2386806"/>
+            <a:ext cx="5143500" cy="3314700"/>
+          </a:xfrm>
+        </p:spPr>
+      </p:pic>
     </p:spTree>
     <p:extLst>
       <p:ext uri="{BB962C8B-B14F-4D97-AF65-F5344CB8AC3E}">
-        <p14:creationId xmlns:p14="http://schemas.microsoft.com/office/powerpoint/2010/main" val="1619147207"/>
+        <p14:creationId xmlns:p14="http://schemas.microsoft.com/office/powerpoint/2010/main" val="2461577809"/>
+      </p:ext>
+    </p:extLst>
+  </p:cSld>
+  <p:clrMapOvr>
+    <a:masterClrMapping/>
+  </p:clrMapOvr>
+</p:sld>
+</file>
+
+<file path=ppt/slides/slide8.xml><?xml version="1.0" encoding="utf-8"?>
+<p:sld xmlns:a="http://schemas.openxmlformats.org/drawingml/2006/main" xmlns:r="http://schemas.openxmlformats.org/officeDocument/2006/relationships" xmlns:p="http://schemas.openxmlformats.org/presentationml/2006/main">
+  <p:cSld>
+    <p:spTree>
+      <p:nvGrpSpPr>
+        <p:cNvPr id="1" name=""/>
+        <p:cNvGrpSpPr/>
+        <p:nvPr/>
+      </p:nvGrpSpPr>
+      <p:grpSpPr>
+        <a:xfrm>
+          <a:off x="0" y="0"/>
+          <a:ext cx="0" cy="0"/>
+          <a:chOff x="0" y="0"/>
+          <a:chExt cx="0" cy="0"/>
+        </a:xfrm>
+      </p:grpSpPr>
+      <p:sp>
+        <p:nvSpPr>
+          <p:cNvPr id="2" name="Title 1">
+            <a:extLst>
+              <a:ext uri="{FF2B5EF4-FFF2-40B4-BE49-F238E27FC236}">
+                <a16:creationId xmlns:a16="http://schemas.microsoft.com/office/drawing/2014/main" id="{B712FC38-CAAC-F247-A191-47EABCF9ED1D}"/>
+              </a:ext>
+            </a:extLst>
+          </p:cNvPr>
+          <p:cNvSpPr>
+            <a:spLocks noGrp="1"/>
+          </p:cNvSpPr>
+          <p:nvPr>
+            <p:ph type="title"/>
+          </p:nvPr>
+        </p:nvSpPr>
+        <p:spPr/>
+        <p:txBody>
+          <a:bodyPr/>
+          <a:lstStyle/>
+          <a:p>
+            <a:r>
+              <a:rPr lang="en-US" dirty="0"/>
+              <a:t>Data Collection</a:t>
+            </a:r>
+          </a:p>
+        </p:txBody>
+      </p:sp>
+      <p:sp>
+        <p:nvSpPr>
+          <p:cNvPr id="3" name="Content Placeholder 2">
+            <a:extLst>
+              <a:ext uri="{FF2B5EF4-FFF2-40B4-BE49-F238E27FC236}">
+                <a16:creationId xmlns:a16="http://schemas.microsoft.com/office/drawing/2014/main" id="{6B14201E-CD7B-1343-A74B-39CFB94CECF3}"/>
+              </a:ext>
+            </a:extLst>
+          </p:cNvPr>
+          <p:cNvSpPr>
+            <a:spLocks noGrp="1"/>
+          </p:cNvSpPr>
+          <p:nvPr>
+            <p:ph sz="half" idx="1"/>
+          </p:nvPr>
+        </p:nvSpPr>
+        <p:spPr/>
+        <p:txBody>
+          <a:bodyPr/>
+          <a:lstStyle/>
+          <a:p>
+            <a:r>
+              <a:rPr lang="en-US" dirty="0"/>
+              <a:t>Created a separate function to iterate over each game and combine the data of each type into a single data frame</a:t>
+            </a:r>
+          </a:p>
+          <a:p>
+            <a:r>
+              <a:rPr lang="en-US" dirty="0"/>
+              <a:t>Split data out into standalone CSVs for import into MySQL Workbench</a:t>
+            </a:r>
+          </a:p>
+        </p:txBody>
+      </p:sp>
+      <p:pic>
+        <p:nvPicPr>
+          <p:cNvPr id="6" name="Content Placeholder 5">
+            <a:extLst>
+              <a:ext uri="{FF2B5EF4-FFF2-40B4-BE49-F238E27FC236}">
+                <a16:creationId xmlns:a16="http://schemas.microsoft.com/office/drawing/2014/main" id="{AB3D3908-33C2-1540-8E20-2607DFAEF109}"/>
+              </a:ext>
+            </a:extLst>
+          </p:cNvPr>
+          <p:cNvPicPr>
+            <a:picLocks noGrp="1" noChangeAspect="1"/>
+          </p:cNvPicPr>
+          <p:nvPr>
+            <p:ph sz="half" idx="2"/>
+          </p:nvPr>
+        </p:nvPicPr>
+        <p:blipFill>
+          <a:blip r:embed="rId2"/>
+          <a:stretch>
+            <a:fillRect/>
+          </a:stretch>
+        </p:blipFill>
+        <p:spPr>
+          <a:xfrm>
+            <a:off x="7543973" y="2046509"/>
+            <a:ext cx="3492623" cy="4504620"/>
+          </a:xfrm>
+        </p:spPr>
+      </p:pic>
+    </p:spTree>
+    <p:extLst>
+      <p:ext uri="{BB962C8B-B14F-4D97-AF65-F5344CB8AC3E}">
+        <p14:creationId xmlns:p14="http://schemas.microsoft.com/office/powerpoint/2010/main" val="3440414"/>
+      </p:ext>
+    </p:extLst>
+  </p:cSld>
+  <p:clrMapOvr>
+    <a:masterClrMapping/>
+  </p:clrMapOvr>
+</p:sld>
+</file>
+
+<file path=ppt/slides/slide9.xml><?xml version="1.0" encoding="utf-8"?>
+<p:sld xmlns:a="http://schemas.openxmlformats.org/drawingml/2006/main" xmlns:r="http://schemas.openxmlformats.org/officeDocument/2006/relationships" xmlns:p="http://schemas.openxmlformats.org/presentationml/2006/main">
+  <p:cSld>
+    <p:spTree>
+      <p:nvGrpSpPr>
+        <p:cNvPr id="1" name=""/>
+        <p:cNvGrpSpPr/>
+        <p:nvPr/>
+      </p:nvGrpSpPr>
+      <p:grpSpPr>
+        <a:xfrm>
+          <a:off x="0" y="0"/>
+          <a:ext cx="0" cy="0"/>
+          <a:chOff x="0" y="0"/>
+          <a:chExt cx="0" cy="0"/>
+        </a:xfrm>
+      </p:grpSpPr>
+      <p:sp>
+        <p:nvSpPr>
+          <p:cNvPr id="5" name="Title 4">
+            <a:extLst>
+              <a:ext uri="{FF2B5EF4-FFF2-40B4-BE49-F238E27FC236}">
+                <a16:creationId xmlns:a16="http://schemas.microsoft.com/office/drawing/2014/main" id="{287C3BCD-F1AA-EA49-B6F1-3C29251CC21F}"/>
+              </a:ext>
+            </a:extLst>
+          </p:cNvPr>
+          <p:cNvSpPr>
+            <a:spLocks noGrp="1"/>
+          </p:cNvSpPr>
+          <p:nvPr>
+            <p:ph type="title"/>
+          </p:nvPr>
+        </p:nvSpPr>
+        <p:spPr/>
+        <p:txBody>
+          <a:bodyPr/>
+          <a:lstStyle/>
+          <a:p>
+            <a:r>
+              <a:rPr lang="en-US" dirty="0"/>
+              <a:t>MySQL Workbench</a:t>
+            </a:r>
+          </a:p>
+        </p:txBody>
+      </p:sp>
+      <p:sp>
+        <p:nvSpPr>
+          <p:cNvPr id="6" name="Text Placeholder 5">
+            <a:extLst>
+              <a:ext uri="{FF2B5EF4-FFF2-40B4-BE49-F238E27FC236}">
+                <a16:creationId xmlns:a16="http://schemas.microsoft.com/office/drawing/2014/main" id="{576F54E5-0F6D-F646-95F9-F30422F61CE3}"/>
+              </a:ext>
+            </a:extLst>
+          </p:cNvPr>
+          <p:cNvSpPr>
+            <a:spLocks noGrp="1"/>
+          </p:cNvSpPr>
+          <p:nvPr>
+            <p:ph type="body" idx="1"/>
+          </p:nvPr>
+        </p:nvSpPr>
+        <p:spPr/>
+        <p:txBody>
+          <a:bodyPr/>
+          <a:lstStyle/>
+          <a:p>
+            <a:endParaRPr lang="en-US"/>
+          </a:p>
+        </p:txBody>
+      </p:sp>
+    </p:spTree>
+    <p:extLst>
+      <p:ext uri="{BB962C8B-B14F-4D97-AF65-F5344CB8AC3E}">
+        <p14:creationId xmlns:p14="http://schemas.microsoft.com/office/powerpoint/2010/main" val="3550029264"/>
       </p:ext>
     </p:extLst>
   </p:cSld>

</xml_diff>

<commit_message>
adjust transitions on word cloud slide
</commit_message>
<xml_diff>
--- a/docs/Analyzing_Jeopardy_Data.pptx
+++ b/docs/Analyzing_Jeopardy_Data.pptx
@@ -373,7 +373,7 @@
           <a:p>
             <a:fld id="{1160EA64-D806-43AC-9DF2-F8C432F32B4C}" type="datetimeFigureOut">
               <a:rPr lang="en-US" smtClean="0"/>
-              <a:t>4/3/2021</a:t>
+              <a:t>4/3/21</a:t>
             </a:fld>
             <a:endParaRPr lang="en-US" dirty="0"/>
           </a:p>
@@ -636,7 +636,7 @@
           <a:p>
             <a:fld id="{E9F9C37B-1D36-470B-8223-D6C91242EC14}" type="datetimeFigureOut">
               <a:rPr lang="en-US" smtClean="0"/>
-              <a:t>4/3/2021</a:t>
+              <a:t>4/3/21</a:t>
             </a:fld>
             <a:endParaRPr lang="en-US" dirty="0"/>
           </a:p>
@@ -871,7 +871,7 @@
           <a:p>
             <a:fld id="{67C6F52A-A82B-47A2-A83A-8C4C91F2D59F}" type="datetimeFigureOut">
               <a:rPr lang="en-US" smtClean="0"/>
-              <a:t>4/3/2021</a:t>
+              <a:t>4/3/21</a:t>
             </a:fld>
             <a:endParaRPr lang="en-US" dirty="0"/>
           </a:p>
@@ -1111,7 +1111,7 @@
           <a:p>
             <a:fld id="{F070A7B3-6521-4DCA-87E5-044747A908C1}" type="datetimeFigureOut">
               <a:rPr lang="en-US" smtClean="0"/>
-              <a:t>4/3/2021</a:t>
+              <a:t>4/3/21</a:t>
             </a:fld>
             <a:endParaRPr lang="en-US" dirty="0"/>
           </a:p>
@@ -1419,7 +1419,7 @@
           <a:p>
             <a:fld id="{1160EA64-D806-43AC-9DF2-F8C432F32B4C}" type="datetimeFigureOut">
               <a:rPr lang="en-US" smtClean="0"/>
-              <a:t>4/3/2021</a:t>
+              <a:t>4/3/21</a:t>
             </a:fld>
             <a:endParaRPr lang="en-US" dirty="0"/>
           </a:p>
@@ -1722,7 +1722,7 @@
           <a:p>
             <a:fld id="{AB134690-1557-4C89-A502-4959FE7FAD70}" type="datetimeFigureOut">
               <a:rPr lang="en-US" smtClean="0"/>
-              <a:t>4/3/2021</a:t>
+              <a:t>4/3/21</a:t>
             </a:fld>
             <a:endParaRPr lang="en-US" dirty="0"/>
           </a:p>
@@ -2144,7 +2144,7 @@
           <a:p>
             <a:fld id="{1160EA64-D806-43AC-9DF2-F8C432F32B4C}" type="datetimeFigureOut">
               <a:rPr lang="en-US" smtClean="0"/>
-              <a:t>4/3/2021</a:t>
+              <a:t>4/3/21</a:t>
             </a:fld>
             <a:endParaRPr lang="en-US" dirty="0"/>
           </a:p>
@@ -2241,7 +2241,7 @@
           <a:p>
             <a:fld id="{E1037C31-9E7A-4F99-8774-A0E530DE1A42}" type="datetimeFigureOut">
               <a:rPr lang="en-US" smtClean="0"/>
-              <a:t>4/3/2021</a:t>
+              <a:t>4/3/21</a:t>
             </a:fld>
             <a:endParaRPr lang="en-US" dirty="0"/>
           </a:p>
@@ -2403,7 +2403,7 @@
           <a:p>
             <a:fld id="{C278504F-A551-4DE0-9316-4DCD1D8CC752}" type="datetimeFigureOut">
               <a:rPr lang="en-US" smtClean="0"/>
-              <a:t>4/3/2021</a:t>
+              <a:t>4/3/21</a:t>
             </a:fld>
             <a:endParaRPr lang="en-US" dirty="0"/>
           </a:p>
@@ -2781,7 +2781,7 @@
           <a:p>
             <a:fld id="{1160EA64-D806-43AC-9DF2-F8C432F32B4C}" type="datetimeFigureOut">
               <a:rPr lang="en-US" smtClean="0"/>
-              <a:t>4/3/2021</a:t>
+              <a:t>4/3/21</a:t>
             </a:fld>
             <a:endParaRPr lang="en-US" dirty="0"/>
           </a:p>
@@ -3072,7 +3072,7 @@
             <a:fld id="{1160EA64-D806-43AC-9DF2-F8C432F32B4C}" type="datetimeFigureOut">
               <a:rPr lang="en-US" smtClean="0"/>
               <a:pPr/>
-              <a:t>4/3/2021</a:t>
+              <a:t>4/3/21</a:t>
             </a:fld>
             <a:endParaRPr lang="en-US" dirty="0"/>
           </a:p>
@@ -3284,7 +3284,7 @@
           <a:p>
             <a:fld id="{1160EA64-D806-43AC-9DF2-F8C432F32B4C}" type="datetimeFigureOut">
               <a:rPr lang="en-US" smtClean="0"/>
-              <a:t>4/3/2021</a:t>
+              <a:t>4/3/21</a:t>
             </a:fld>
             <a:endParaRPr lang="en-US" dirty="0"/>
           </a:p>
@@ -5554,41 +5554,6 @@
           </a:p>
         </p:txBody>
       </p:sp>
-      <p:sp>
-        <p:nvSpPr>
-          <p:cNvPr id="6" name="Text Placeholder 5">
-            <a:extLst>
-              <a:ext uri="{FF2B5EF4-FFF2-40B4-BE49-F238E27FC236}">
-                <a16:creationId xmlns:a16="http://schemas.microsoft.com/office/drawing/2014/main" id="{5D222C0A-F7F5-4476-83A3-18EB8475FE14}"/>
-              </a:ext>
-            </a:extLst>
-          </p:cNvPr>
-          <p:cNvSpPr>
-            <a:spLocks noGrp="1"/>
-          </p:cNvSpPr>
-          <p:nvPr>
-            <p:ph type="body" sz="half" idx="2"/>
-          </p:nvPr>
-        </p:nvSpPr>
-        <p:spPr>
-          <a:xfrm>
-            <a:off x="581192" y="5260127"/>
-            <a:ext cx="11029617" cy="598671"/>
-          </a:xfrm>
-        </p:spPr>
-        <p:txBody>
-          <a:bodyPr>
-            <a:normAutofit/>
-          </a:bodyPr>
-          <a:lstStyle/>
-          <a:p>
-            <a:r>
-              <a:rPr lang="en-US" sz="2400" dirty="0"/>
-              <a:t>What are the most common daily double clue categories?</a:t>
-            </a:r>
-          </a:p>
-        </p:txBody>
-      </p:sp>
       <p:pic>
         <p:nvPicPr>
           <p:cNvPr id="8" name="Picture 7" descr="Text&#10;&#10;Description automatically generated">
@@ -5848,242 +5813,7 @@
           <a:p>
             <a:r>
               <a:rPr lang="en-US" sz="2400" dirty="0"/>
-              <a:t>What are the most common daily double clue clues?</a:t>
-            </a:r>
-          </a:p>
-        </p:txBody>
-      </p:sp>
-      <p:sp>
-        <p:nvSpPr>
-          <p:cNvPr id="10" name="Text Placeholder 5">
-            <a:extLst>
-              <a:ext uri="{FF2B5EF4-FFF2-40B4-BE49-F238E27FC236}">
-                <a16:creationId xmlns:a16="http://schemas.microsoft.com/office/drawing/2014/main" id="{862A68C0-5728-43E8-AC11-A46EDE76A973}"/>
-              </a:ext>
-            </a:extLst>
-          </p:cNvPr>
-          <p:cNvSpPr txBox="1">
-            <a:spLocks/>
-          </p:cNvSpPr>
-          <p:nvPr/>
-        </p:nvSpPr>
-        <p:spPr>
-          <a:xfrm>
-            <a:off x="885992" y="5564927"/>
-            <a:ext cx="11029617" cy="598671"/>
-          </a:xfrm>
-          <a:prstGeom prst="rect">
-            <a:avLst/>
-          </a:prstGeom>
-        </p:spPr>
-        <p:txBody>
-          <a:bodyPr vert="horz" lIns="91440" tIns="45720" rIns="91440" bIns="45720" rtlCol="0" anchor="ctr">
-            <a:normAutofit/>
-          </a:bodyPr>
-          <a:lstStyle>
-            <a:lvl1pPr marL="0" indent="0" algn="l" defTabSz="457200" rtl="0" eaLnBrk="1" latinLnBrk="0" hangingPunct="1">
-              <a:spcBef>
-                <a:spcPct val="20000"/>
-              </a:spcBef>
-              <a:spcAft>
-                <a:spcPts val="600"/>
-              </a:spcAft>
-              <a:buClr>
-                <a:schemeClr val="accent2"/>
-              </a:buClr>
-              <a:buSzPct val="92000"/>
-              <a:buFont typeface="Wingdings 2" panose="05020102010507070707" pitchFamily="18" charset="2"/>
-              <a:buNone/>
-              <a:defRPr sz="1200" kern="1200">
-                <a:solidFill>
-                  <a:schemeClr val="tx2"/>
-                </a:solidFill>
-                <a:latin typeface="+mn-lt"/>
-                <a:ea typeface="+mn-ea"/>
-                <a:cs typeface="+mn-cs"/>
-              </a:defRPr>
-            </a:lvl1pPr>
-            <a:lvl2pPr marL="457200" indent="0" algn="l" defTabSz="457200" rtl="0" eaLnBrk="1" latinLnBrk="0" hangingPunct="1">
-              <a:spcBef>
-                <a:spcPct val="20000"/>
-              </a:spcBef>
-              <a:spcAft>
-                <a:spcPts val="600"/>
-              </a:spcAft>
-              <a:buClr>
-                <a:schemeClr val="accent2"/>
-              </a:buClr>
-              <a:buSzPct val="92000"/>
-              <a:buFont typeface="Wingdings 2" panose="05020102010507070707" pitchFamily="18" charset="2"/>
-              <a:buNone/>
-              <a:defRPr sz="1200" kern="1200">
-                <a:solidFill>
-                  <a:schemeClr val="tx2"/>
-                </a:solidFill>
-                <a:latin typeface="+mn-lt"/>
-                <a:ea typeface="+mn-ea"/>
-                <a:cs typeface="+mn-cs"/>
-              </a:defRPr>
-            </a:lvl2pPr>
-            <a:lvl3pPr marL="914400" indent="0" algn="l" defTabSz="457200" rtl="0" eaLnBrk="1" latinLnBrk="0" hangingPunct="1">
-              <a:spcBef>
-                <a:spcPct val="20000"/>
-              </a:spcBef>
-              <a:spcAft>
-                <a:spcPts val="600"/>
-              </a:spcAft>
-              <a:buClr>
-                <a:schemeClr val="accent2"/>
-              </a:buClr>
-              <a:buSzPct val="92000"/>
-              <a:buFont typeface="Wingdings 2" panose="05020102010507070707" pitchFamily="18" charset="2"/>
-              <a:buNone/>
-              <a:defRPr sz="1000" kern="1200">
-                <a:solidFill>
-                  <a:schemeClr val="tx2"/>
-                </a:solidFill>
-                <a:latin typeface="+mn-lt"/>
-                <a:ea typeface="+mn-ea"/>
-                <a:cs typeface="+mn-cs"/>
-              </a:defRPr>
-            </a:lvl3pPr>
-            <a:lvl4pPr marL="1371600" indent="0" algn="l" defTabSz="457200" rtl="0" eaLnBrk="1" latinLnBrk="0" hangingPunct="1">
-              <a:spcBef>
-                <a:spcPct val="20000"/>
-              </a:spcBef>
-              <a:spcAft>
-                <a:spcPts val="600"/>
-              </a:spcAft>
-              <a:buClr>
-                <a:schemeClr val="accent2"/>
-              </a:buClr>
-              <a:buSzPct val="92000"/>
-              <a:buFont typeface="Wingdings 2" panose="05020102010507070707" pitchFamily="18" charset="2"/>
-              <a:buNone/>
-              <a:defRPr sz="900" kern="1200">
-                <a:solidFill>
-                  <a:schemeClr val="tx2"/>
-                </a:solidFill>
-                <a:latin typeface="+mn-lt"/>
-                <a:ea typeface="+mn-ea"/>
-                <a:cs typeface="+mn-cs"/>
-              </a:defRPr>
-            </a:lvl4pPr>
-            <a:lvl5pPr marL="1828800" indent="0" algn="l" defTabSz="457200" rtl="0" eaLnBrk="1" latinLnBrk="0" hangingPunct="1">
-              <a:spcBef>
-                <a:spcPct val="20000"/>
-              </a:spcBef>
-              <a:spcAft>
-                <a:spcPts val="600"/>
-              </a:spcAft>
-              <a:buClr>
-                <a:schemeClr val="accent2"/>
-              </a:buClr>
-              <a:buSzPct val="92000"/>
-              <a:buFont typeface="Wingdings 2" panose="05020102010507070707" pitchFamily="18" charset="2"/>
-              <a:buNone/>
-              <a:defRPr sz="900" kern="1200">
-                <a:solidFill>
-                  <a:schemeClr val="tx2"/>
-                </a:solidFill>
-                <a:latin typeface="+mn-lt"/>
-                <a:ea typeface="+mn-ea"/>
-                <a:cs typeface="+mn-cs"/>
-              </a:defRPr>
-            </a:lvl5pPr>
-            <a:lvl6pPr marL="2286000" indent="0" algn="l" defTabSz="457200" rtl="0" eaLnBrk="1" latinLnBrk="0" hangingPunct="1">
-              <a:spcBef>
-                <a:spcPct val="20000"/>
-              </a:spcBef>
-              <a:spcAft>
-                <a:spcPts val="600"/>
-              </a:spcAft>
-              <a:buClr>
-                <a:schemeClr val="accent2"/>
-              </a:buClr>
-              <a:buSzPct val="92000"/>
-              <a:buFont typeface="Wingdings 2" panose="05020102010507070707" pitchFamily="18" charset="2"/>
-              <a:buNone/>
-              <a:defRPr sz="900" kern="1200">
-                <a:solidFill>
-                  <a:schemeClr val="tx2"/>
-                </a:solidFill>
-                <a:latin typeface="+mn-lt"/>
-                <a:ea typeface="+mn-ea"/>
-                <a:cs typeface="+mn-cs"/>
-              </a:defRPr>
-            </a:lvl6pPr>
-            <a:lvl7pPr marL="2743200" indent="0" algn="l" defTabSz="457200" rtl="0" eaLnBrk="1" latinLnBrk="0" hangingPunct="1">
-              <a:spcBef>
-                <a:spcPct val="20000"/>
-              </a:spcBef>
-              <a:spcAft>
-                <a:spcPts val="600"/>
-              </a:spcAft>
-              <a:buClr>
-                <a:schemeClr val="accent2"/>
-              </a:buClr>
-              <a:buSzPct val="92000"/>
-              <a:buFont typeface="Wingdings 2" panose="05020102010507070707" pitchFamily="18" charset="2"/>
-              <a:buNone/>
-              <a:defRPr sz="900" kern="1200">
-                <a:solidFill>
-                  <a:schemeClr val="tx2"/>
-                </a:solidFill>
-                <a:latin typeface="+mn-lt"/>
-                <a:ea typeface="+mn-ea"/>
-                <a:cs typeface="+mn-cs"/>
-              </a:defRPr>
-            </a:lvl7pPr>
-            <a:lvl8pPr marL="3200400" indent="0" algn="l" defTabSz="457200" rtl="0" eaLnBrk="1" latinLnBrk="0" hangingPunct="1">
-              <a:spcBef>
-                <a:spcPct val="20000"/>
-              </a:spcBef>
-              <a:spcAft>
-                <a:spcPts val="600"/>
-              </a:spcAft>
-              <a:buClr>
-                <a:schemeClr val="accent2"/>
-              </a:buClr>
-              <a:buSzPct val="92000"/>
-              <a:buFont typeface="Wingdings 2" panose="05020102010507070707" pitchFamily="18" charset="2"/>
-              <a:buNone/>
-              <a:defRPr sz="900" kern="1200">
-                <a:solidFill>
-                  <a:schemeClr val="tx2"/>
-                </a:solidFill>
-                <a:latin typeface="+mn-lt"/>
-                <a:ea typeface="+mn-ea"/>
-                <a:cs typeface="+mn-cs"/>
-              </a:defRPr>
-            </a:lvl8pPr>
-            <a:lvl9pPr marL="3657600" indent="0" algn="l" defTabSz="457200" rtl="0" eaLnBrk="1" latinLnBrk="0" hangingPunct="1">
-              <a:spcBef>
-                <a:spcPct val="20000"/>
-              </a:spcBef>
-              <a:spcAft>
-                <a:spcPts val="600"/>
-              </a:spcAft>
-              <a:buClr>
-                <a:schemeClr val="accent2"/>
-              </a:buClr>
-              <a:buSzPct val="92000"/>
-              <a:buFont typeface="Wingdings 2" panose="05020102010507070707" pitchFamily="18" charset="2"/>
-              <a:buNone/>
-              <a:defRPr sz="900" kern="1200">
-                <a:solidFill>
-                  <a:schemeClr val="tx2"/>
-                </a:solidFill>
-                <a:latin typeface="+mn-lt"/>
-                <a:ea typeface="+mn-ea"/>
-                <a:cs typeface="+mn-cs"/>
-              </a:defRPr>
-            </a:lvl9pPr>
-          </a:lstStyle>
-          <a:p>
-            <a:r>
-              <a:rPr lang="en-US" sz="2400" dirty="0"/>
-              <a:t>What are the most common daily double clue answers?</a:t>
+              <a:t>What are the most common daily double</a:t>
             </a:r>
           </a:p>
         </p:txBody>
@@ -6147,6 +5877,711 @@
           </a:prstGeom>
         </p:spPr>
       </p:pic>
+      <p:sp>
+        <p:nvSpPr>
+          <p:cNvPr id="11" name="Text Placeholder 5">
+            <a:extLst>
+              <a:ext uri="{FF2B5EF4-FFF2-40B4-BE49-F238E27FC236}">
+                <a16:creationId xmlns:a16="http://schemas.microsoft.com/office/drawing/2014/main" id="{0BB2E547-C3C8-0C43-A991-C7C4AADF6E97}"/>
+              </a:ext>
+            </a:extLst>
+          </p:cNvPr>
+          <p:cNvSpPr txBox="1">
+            <a:spLocks/>
+          </p:cNvSpPr>
+          <p:nvPr/>
+        </p:nvSpPr>
+        <p:spPr>
+          <a:xfrm>
+            <a:off x="6002033" y="5412527"/>
+            <a:ext cx="1029895" cy="598671"/>
+          </a:xfrm>
+          <a:prstGeom prst="rect">
+            <a:avLst/>
+          </a:prstGeom>
+        </p:spPr>
+        <p:txBody>
+          <a:bodyPr vert="horz" lIns="91440" tIns="45720" rIns="91440" bIns="45720" rtlCol="0" anchor="ctr">
+            <a:normAutofit/>
+          </a:bodyPr>
+          <a:lstStyle>
+            <a:lvl1pPr marL="0" indent="0" algn="l" defTabSz="457200" rtl="0" eaLnBrk="1" latinLnBrk="0" hangingPunct="1">
+              <a:spcBef>
+                <a:spcPct val="20000"/>
+              </a:spcBef>
+              <a:spcAft>
+                <a:spcPts val="600"/>
+              </a:spcAft>
+              <a:buClr>
+                <a:schemeClr val="accent2"/>
+              </a:buClr>
+              <a:buSzPct val="92000"/>
+              <a:buFont typeface="Wingdings 2" panose="05020102010507070707" pitchFamily="18" charset="2"/>
+              <a:buNone/>
+              <a:defRPr sz="1200" kern="1200">
+                <a:solidFill>
+                  <a:schemeClr val="tx2"/>
+                </a:solidFill>
+                <a:latin typeface="+mn-lt"/>
+                <a:ea typeface="+mn-ea"/>
+                <a:cs typeface="+mn-cs"/>
+              </a:defRPr>
+            </a:lvl1pPr>
+            <a:lvl2pPr marL="457200" indent="0" algn="l" defTabSz="457200" rtl="0" eaLnBrk="1" latinLnBrk="0" hangingPunct="1">
+              <a:spcBef>
+                <a:spcPct val="20000"/>
+              </a:spcBef>
+              <a:spcAft>
+                <a:spcPts val="600"/>
+              </a:spcAft>
+              <a:buClr>
+                <a:schemeClr val="accent2"/>
+              </a:buClr>
+              <a:buSzPct val="92000"/>
+              <a:buFont typeface="Wingdings 2" panose="05020102010507070707" pitchFamily="18" charset="2"/>
+              <a:buNone/>
+              <a:defRPr sz="1200" kern="1200">
+                <a:solidFill>
+                  <a:schemeClr val="tx2"/>
+                </a:solidFill>
+                <a:latin typeface="+mn-lt"/>
+                <a:ea typeface="+mn-ea"/>
+                <a:cs typeface="+mn-cs"/>
+              </a:defRPr>
+            </a:lvl2pPr>
+            <a:lvl3pPr marL="914400" indent="0" algn="l" defTabSz="457200" rtl="0" eaLnBrk="1" latinLnBrk="0" hangingPunct="1">
+              <a:spcBef>
+                <a:spcPct val="20000"/>
+              </a:spcBef>
+              <a:spcAft>
+                <a:spcPts val="600"/>
+              </a:spcAft>
+              <a:buClr>
+                <a:schemeClr val="accent2"/>
+              </a:buClr>
+              <a:buSzPct val="92000"/>
+              <a:buFont typeface="Wingdings 2" panose="05020102010507070707" pitchFamily="18" charset="2"/>
+              <a:buNone/>
+              <a:defRPr sz="1000" kern="1200">
+                <a:solidFill>
+                  <a:schemeClr val="tx2"/>
+                </a:solidFill>
+                <a:latin typeface="+mn-lt"/>
+                <a:ea typeface="+mn-ea"/>
+                <a:cs typeface="+mn-cs"/>
+              </a:defRPr>
+            </a:lvl3pPr>
+            <a:lvl4pPr marL="1371600" indent="0" algn="l" defTabSz="457200" rtl="0" eaLnBrk="1" latinLnBrk="0" hangingPunct="1">
+              <a:spcBef>
+                <a:spcPct val="20000"/>
+              </a:spcBef>
+              <a:spcAft>
+                <a:spcPts val="600"/>
+              </a:spcAft>
+              <a:buClr>
+                <a:schemeClr val="accent2"/>
+              </a:buClr>
+              <a:buSzPct val="92000"/>
+              <a:buFont typeface="Wingdings 2" panose="05020102010507070707" pitchFamily="18" charset="2"/>
+              <a:buNone/>
+              <a:defRPr sz="900" kern="1200">
+                <a:solidFill>
+                  <a:schemeClr val="tx2"/>
+                </a:solidFill>
+                <a:latin typeface="+mn-lt"/>
+                <a:ea typeface="+mn-ea"/>
+                <a:cs typeface="+mn-cs"/>
+              </a:defRPr>
+            </a:lvl4pPr>
+            <a:lvl5pPr marL="1828800" indent="0" algn="l" defTabSz="457200" rtl="0" eaLnBrk="1" latinLnBrk="0" hangingPunct="1">
+              <a:spcBef>
+                <a:spcPct val="20000"/>
+              </a:spcBef>
+              <a:spcAft>
+                <a:spcPts val="600"/>
+              </a:spcAft>
+              <a:buClr>
+                <a:schemeClr val="accent2"/>
+              </a:buClr>
+              <a:buSzPct val="92000"/>
+              <a:buFont typeface="Wingdings 2" panose="05020102010507070707" pitchFamily="18" charset="2"/>
+              <a:buNone/>
+              <a:defRPr sz="900" kern="1200">
+                <a:solidFill>
+                  <a:schemeClr val="tx2"/>
+                </a:solidFill>
+                <a:latin typeface="+mn-lt"/>
+                <a:ea typeface="+mn-ea"/>
+                <a:cs typeface="+mn-cs"/>
+              </a:defRPr>
+            </a:lvl5pPr>
+            <a:lvl6pPr marL="2286000" indent="0" algn="l" defTabSz="457200" rtl="0" eaLnBrk="1" latinLnBrk="0" hangingPunct="1">
+              <a:spcBef>
+                <a:spcPct val="20000"/>
+              </a:spcBef>
+              <a:spcAft>
+                <a:spcPts val="600"/>
+              </a:spcAft>
+              <a:buClr>
+                <a:schemeClr val="accent2"/>
+              </a:buClr>
+              <a:buSzPct val="92000"/>
+              <a:buFont typeface="Wingdings 2" panose="05020102010507070707" pitchFamily="18" charset="2"/>
+              <a:buNone/>
+              <a:defRPr sz="900" kern="1200">
+                <a:solidFill>
+                  <a:schemeClr val="tx2"/>
+                </a:solidFill>
+                <a:latin typeface="+mn-lt"/>
+                <a:ea typeface="+mn-ea"/>
+                <a:cs typeface="+mn-cs"/>
+              </a:defRPr>
+            </a:lvl6pPr>
+            <a:lvl7pPr marL="2743200" indent="0" algn="l" defTabSz="457200" rtl="0" eaLnBrk="1" latinLnBrk="0" hangingPunct="1">
+              <a:spcBef>
+                <a:spcPct val="20000"/>
+              </a:spcBef>
+              <a:spcAft>
+                <a:spcPts val="600"/>
+              </a:spcAft>
+              <a:buClr>
+                <a:schemeClr val="accent2"/>
+              </a:buClr>
+              <a:buSzPct val="92000"/>
+              <a:buFont typeface="Wingdings 2" panose="05020102010507070707" pitchFamily="18" charset="2"/>
+              <a:buNone/>
+              <a:defRPr sz="900" kern="1200">
+                <a:solidFill>
+                  <a:schemeClr val="tx2"/>
+                </a:solidFill>
+                <a:latin typeface="+mn-lt"/>
+                <a:ea typeface="+mn-ea"/>
+                <a:cs typeface="+mn-cs"/>
+              </a:defRPr>
+            </a:lvl7pPr>
+            <a:lvl8pPr marL="3200400" indent="0" algn="l" defTabSz="457200" rtl="0" eaLnBrk="1" latinLnBrk="0" hangingPunct="1">
+              <a:spcBef>
+                <a:spcPct val="20000"/>
+              </a:spcBef>
+              <a:spcAft>
+                <a:spcPts val="600"/>
+              </a:spcAft>
+              <a:buClr>
+                <a:schemeClr val="accent2"/>
+              </a:buClr>
+              <a:buSzPct val="92000"/>
+              <a:buFont typeface="Wingdings 2" panose="05020102010507070707" pitchFamily="18" charset="2"/>
+              <a:buNone/>
+              <a:defRPr sz="900" kern="1200">
+                <a:solidFill>
+                  <a:schemeClr val="tx2"/>
+                </a:solidFill>
+                <a:latin typeface="+mn-lt"/>
+                <a:ea typeface="+mn-ea"/>
+                <a:cs typeface="+mn-cs"/>
+              </a:defRPr>
+            </a:lvl8pPr>
+            <a:lvl9pPr marL="3657600" indent="0" algn="l" defTabSz="457200" rtl="0" eaLnBrk="1" latinLnBrk="0" hangingPunct="1">
+              <a:spcBef>
+                <a:spcPct val="20000"/>
+              </a:spcBef>
+              <a:spcAft>
+                <a:spcPts val="600"/>
+              </a:spcAft>
+              <a:buClr>
+                <a:schemeClr val="accent2"/>
+              </a:buClr>
+              <a:buSzPct val="92000"/>
+              <a:buFont typeface="Wingdings 2" panose="05020102010507070707" pitchFamily="18" charset="2"/>
+              <a:buNone/>
+              <a:defRPr sz="900" kern="1200">
+                <a:solidFill>
+                  <a:schemeClr val="tx2"/>
+                </a:solidFill>
+                <a:latin typeface="+mn-lt"/>
+                <a:ea typeface="+mn-ea"/>
+                <a:cs typeface="+mn-cs"/>
+              </a:defRPr>
+            </a:lvl9pPr>
+          </a:lstStyle>
+          <a:p>
+            <a:r>
+              <a:rPr lang="en-US" sz="2400" b="1" dirty="0"/>
+              <a:t>clues?</a:t>
+            </a:r>
+          </a:p>
+        </p:txBody>
+      </p:sp>
+      <p:sp>
+        <p:nvSpPr>
+          <p:cNvPr id="13" name="Text Placeholder 5">
+            <a:extLst>
+              <a:ext uri="{FF2B5EF4-FFF2-40B4-BE49-F238E27FC236}">
+                <a16:creationId xmlns:a16="http://schemas.microsoft.com/office/drawing/2014/main" id="{129B38CD-E7A4-C54D-A2A9-6D39B8530A40}"/>
+              </a:ext>
+            </a:extLst>
+          </p:cNvPr>
+          <p:cNvSpPr txBox="1">
+            <a:spLocks/>
+          </p:cNvSpPr>
+          <p:nvPr/>
+        </p:nvSpPr>
+        <p:spPr>
+          <a:xfrm>
+            <a:off x="6002033" y="5412527"/>
+            <a:ext cx="1508867" cy="598671"/>
+          </a:xfrm>
+          <a:prstGeom prst="rect">
+            <a:avLst/>
+          </a:prstGeom>
+        </p:spPr>
+        <p:txBody>
+          <a:bodyPr vert="horz" lIns="91440" tIns="45720" rIns="91440" bIns="45720" rtlCol="0" anchor="ctr">
+            <a:normAutofit fontScale="85000" lnSpcReduction="10000"/>
+          </a:bodyPr>
+          <a:lstStyle>
+            <a:lvl1pPr marL="0" indent="0" algn="l" defTabSz="457200" rtl="0" eaLnBrk="1" latinLnBrk="0" hangingPunct="1">
+              <a:spcBef>
+                <a:spcPct val="20000"/>
+              </a:spcBef>
+              <a:spcAft>
+                <a:spcPts val="600"/>
+              </a:spcAft>
+              <a:buClr>
+                <a:schemeClr val="accent2"/>
+              </a:buClr>
+              <a:buSzPct val="92000"/>
+              <a:buFont typeface="Wingdings 2" panose="05020102010507070707" pitchFamily="18" charset="2"/>
+              <a:buNone/>
+              <a:defRPr sz="1200" kern="1200">
+                <a:solidFill>
+                  <a:schemeClr val="tx2"/>
+                </a:solidFill>
+                <a:latin typeface="+mn-lt"/>
+                <a:ea typeface="+mn-ea"/>
+                <a:cs typeface="+mn-cs"/>
+              </a:defRPr>
+            </a:lvl1pPr>
+            <a:lvl2pPr marL="457200" indent="0" algn="l" defTabSz="457200" rtl="0" eaLnBrk="1" latinLnBrk="0" hangingPunct="1">
+              <a:spcBef>
+                <a:spcPct val="20000"/>
+              </a:spcBef>
+              <a:spcAft>
+                <a:spcPts val="600"/>
+              </a:spcAft>
+              <a:buClr>
+                <a:schemeClr val="accent2"/>
+              </a:buClr>
+              <a:buSzPct val="92000"/>
+              <a:buFont typeface="Wingdings 2" panose="05020102010507070707" pitchFamily="18" charset="2"/>
+              <a:buNone/>
+              <a:defRPr sz="1200" kern="1200">
+                <a:solidFill>
+                  <a:schemeClr val="tx2"/>
+                </a:solidFill>
+                <a:latin typeface="+mn-lt"/>
+                <a:ea typeface="+mn-ea"/>
+                <a:cs typeface="+mn-cs"/>
+              </a:defRPr>
+            </a:lvl2pPr>
+            <a:lvl3pPr marL="914400" indent="0" algn="l" defTabSz="457200" rtl="0" eaLnBrk="1" latinLnBrk="0" hangingPunct="1">
+              <a:spcBef>
+                <a:spcPct val="20000"/>
+              </a:spcBef>
+              <a:spcAft>
+                <a:spcPts val="600"/>
+              </a:spcAft>
+              <a:buClr>
+                <a:schemeClr val="accent2"/>
+              </a:buClr>
+              <a:buSzPct val="92000"/>
+              <a:buFont typeface="Wingdings 2" panose="05020102010507070707" pitchFamily="18" charset="2"/>
+              <a:buNone/>
+              <a:defRPr sz="1000" kern="1200">
+                <a:solidFill>
+                  <a:schemeClr val="tx2"/>
+                </a:solidFill>
+                <a:latin typeface="+mn-lt"/>
+                <a:ea typeface="+mn-ea"/>
+                <a:cs typeface="+mn-cs"/>
+              </a:defRPr>
+            </a:lvl3pPr>
+            <a:lvl4pPr marL="1371600" indent="0" algn="l" defTabSz="457200" rtl="0" eaLnBrk="1" latinLnBrk="0" hangingPunct="1">
+              <a:spcBef>
+                <a:spcPct val="20000"/>
+              </a:spcBef>
+              <a:spcAft>
+                <a:spcPts val="600"/>
+              </a:spcAft>
+              <a:buClr>
+                <a:schemeClr val="accent2"/>
+              </a:buClr>
+              <a:buSzPct val="92000"/>
+              <a:buFont typeface="Wingdings 2" panose="05020102010507070707" pitchFamily="18" charset="2"/>
+              <a:buNone/>
+              <a:defRPr sz="900" kern="1200">
+                <a:solidFill>
+                  <a:schemeClr val="tx2"/>
+                </a:solidFill>
+                <a:latin typeface="+mn-lt"/>
+                <a:ea typeface="+mn-ea"/>
+                <a:cs typeface="+mn-cs"/>
+              </a:defRPr>
+            </a:lvl4pPr>
+            <a:lvl5pPr marL="1828800" indent="0" algn="l" defTabSz="457200" rtl="0" eaLnBrk="1" latinLnBrk="0" hangingPunct="1">
+              <a:spcBef>
+                <a:spcPct val="20000"/>
+              </a:spcBef>
+              <a:spcAft>
+                <a:spcPts val="600"/>
+              </a:spcAft>
+              <a:buClr>
+                <a:schemeClr val="accent2"/>
+              </a:buClr>
+              <a:buSzPct val="92000"/>
+              <a:buFont typeface="Wingdings 2" panose="05020102010507070707" pitchFamily="18" charset="2"/>
+              <a:buNone/>
+              <a:defRPr sz="900" kern="1200">
+                <a:solidFill>
+                  <a:schemeClr val="tx2"/>
+                </a:solidFill>
+                <a:latin typeface="+mn-lt"/>
+                <a:ea typeface="+mn-ea"/>
+                <a:cs typeface="+mn-cs"/>
+              </a:defRPr>
+            </a:lvl5pPr>
+            <a:lvl6pPr marL="2286000" indent="0" algn="l" defTabSz="457200" rtl="0" eaLnBrk="1" latinLnBrk="0" hangingPunct="1">
+              <a:spcBef>
+                <a:spcPct val="20000"/>
+              </a:spcBef>
+              <a:spcAft>
+                <a:spcPts val="600"/>
+              </a:spcAft>
+              <a:buClr>
+                <a:schemeClr val="accent2"/>
+              </a:buClr>
+              <a:buSzPct val="92000"/>
+              <a:buFont typeface="Wingdings 2" panose="05020102010507070707" pitchFamily="18" charset="2"/>
+              <a:buNone/>
+              <a:defRPr sz="900" kern="1200">
+                <a:solidFill>
+                  <a:schemeClr val="tx2"/>
+                </a:solidFill>
+                <a:latin typeface="+mn-lt"/>
+                <a:ea typeface="+mn-ea"/>
+                <a:cs typeface="+mn-cs"/>
+              </a:defRPr>
+            </a:lvl6pPr>
+            <a:lvl7pPr marL="2743200" indent="0" algn="l" defTabSz="457200" rtl="0" eaLnBrk="1" latinLnBrk="0" hangingPunct="1">
+              <a:spcBef>
+                <a:spcPct val="20000"/>
+              </a:spcBef>
+              <a:spcAft>
+                <a:spcPts val="600"/>
+              </a:spcAft>
+              <a:buClr>
+                <a:schemeClr val="accent2"/>
+              </a:buClr>
+              <a:buSzPct val="92000"/>
+              <a:buFont typeface="Wingdings 2" panose="05020102010507070707" pitchFamily="18" charset="2"/>
+              <a:buNone/>
+              <a:defRPr sz="900" kern="1200">
+                <a:solidFill>
+                  <a:schemeClr val="tx2"/>
+                </a:solidFill>
+                <a:latin typeface="+mn-lt"/>
+                <a:ea typeface="+mn-ea"/>
+                <a:cs typeface="+mn-cs"/>
+              </a:defRPr>
+            </a:lvl7pPr>
+            <a:lvl8pPr marL="3200400" indent="0" algn="l" defTabSz="457200" rtl="0" eaLnBrk="1" latinLnBrk="0" hangingPunct="1">
+              <a:spcBef>
+                <a:spcPct val="20000"/>
+              </a:spcBef>
+              <a:spcAft>
+                <a:spcPts val="600"/>
+              </a:spcAft>
+              <a:buClr>
+                <a:schemeClr val="accent2"/>
+              </a:buClr>
+              <a:buSzPct val="92000"/>
+              <a:buFont typeface="Wingdings 2" panose="05020102010507070707" pitchFamily="18" charset="2"/>
+              <a:buNone/>
+              <a:defRPr sz="900" kern="1200">
+                <a:solidFill>
+                  <a:schemeClr val="tx2"/>
+                </a:solidFill>
+                <a:latin typeface="+mn-lt"/>
+                <a:ea typeface="+mn-ea"/>
+                <a:cs typeface="+mn-cs"/>
+              </a:defRPr>
+            </a:lvl8pPr>
+            <a:lvl9pPr marL="3657600" indent="0" algn="l" defTabSz="457200" rtl="0" eaLnBrk="1" latinLnBrk="0" hangingPunct="1">
+              <a:spcBef>
+                <a:spcPct val="20000"/>
+              </a:spcBef>
+              <a:spcAft>
+                <a:spcPts val="600"/>
+              </a:spcAft>
+              <a:buClr>
+                <a:schemeClr val="accent2"/>
+              </a:buClr>
+              <a:buSzPct val="92000"/>
+              <a:buFont typeface="Wingdings 2" panose="05020102010507070707" pitchFamily="18" charset="2"/>
+              <a:buNone/>
+              <a:defRPr sz="900" kern="1200">
+                <a:solidFill>
+                  <a:schemeClr val="tx2"/>
+                </a:solidFill>
+                <a:latin typeface="+mn-lt"/>
+                <a:ea typeface="+mn-ea"/>
+                <a:cs typeface="+mn-cs"/>
+              </a:defRPr>
+            </a:lvl9pPr>
+          </a:lstStyle>
+          <a:p>
+            <a:r>
+              <a:rPr lang="en-US" sz="2400" b="1" dirty="0"/>
+              <a:t>categories?</a:t>
+            </a:r>
+          </a:p>
+        </p:txBody>
+      </p:sp>
+      <p:sp>
+        <p:nvSpPr>
+          <p:cNvPr id="15" name="Text Placeholder 5">
+            <a:extLst>
+              <a:ext uri="{FF2B5EF4-FFF2-40B4-BE49-F238E27FC236}">
+                <a16:creationId xmlns:a16="http://schemas.microsoft.com/office/drawing/2014/main" id="{28F75ECB-C16E-1F45-A0BD-D52C7B424193}"/>
+              </a:ext>
+            </a:extLst>
+          </p:cNvPr>
+          <p:cNvSpPr txBox="1">
+            <a:spLocks/>
+          </p:cNvSpPr>
+          <p:nvPr/>
+        </p:nvSpPr>
+        <p:spPr>
+          <a:xfrm>
+            <a:off x="6002033" y="5412527"/>
+            <a:ext cx="1508867" cy="598671"/>
+          </a:xfrm>
+          <a:prstGeom prst="rect">
+            <a:avLst/>
+          </a:prstGeom>
+        </p:spPr>
+        <p:txBody>
+          <a:bodyPr vert="horz" lIns="91440" tIns="45720" rIns="91440" bIns="45720" rtlCol="0" anchor="ctr">
+            <a:normAutofit/>
+          </a:bodyPr>
+          <a:lstStyle>
+            <a:lvl1pPr marL="0" indent="0" algn="l" defTabSz="457200" rtl="0" eaLnBrk="1" latinLnBrk="0" hangingPunct="1">
+              <a:spcBef>
+                <a:spcPct val="20000"/>
+              </a:spcBef>
+              <a:spcAft>
+                <a:spcPts val="600"/>
+              </a:spcAft>
+              <a:buClr>
+                <a:schemeClr val="accent2"/>
+              </a:buClr>
+              <a:buSzPct val="92000"/>
+              <a:buFont typeface="Wingdings 2" panose="05020102010507070707" pitchFamily="18" charset="2"/>
+              <a:buNone/>
+              <a:defRPr sz="1200" kern="1200">
+                <a:solidFill>
+                  <a:schemeClr val="tx2"/>
+                </a:solidFill>
+                <a:latin typeface="+mn-lt"/>
+                <a:ea typeface="+mn-ea"/>
+                <a:cs typeface="+mn-cs"/>
+              </a:defRPr>
+            </a:lvl1pPr>
+            <a:lvl2pPr marL="457200" indent="0" algn="l" defTabSz="457200" rtl="0" eaLnBrk="1" latinLnBrk="0" hangingPunct="1">
+              <a:spcBef>
+                <a:spcPct val="20000"/>
+              </a:spcBef>
+              <a:spcAft>
+                <a:spcPts val="600"/>
+              </a:spcAft>
+              <a:buClr>
+                <a:schemeClr val="accent2"/>
+              </a:buClr>
+              <a:buSzPct val="92000"/>
+              <a:buFont typeface="Wingdings 2" panose="05020102010507070707" pitchFamily="18" charset="2"/>
+              <a:buNone/>
+              <a:defRPr sz="1200" kern="1200">
+                <a:solidFill>
+                  <a:schemeClr val="tx2"/>
+                </a:solidFill>
+                <a:latin typeface="+mn-lt"/>
+                <a:ea typeface="+mn-ea"/>
+                <a:cs typeface="+mn-cs"/>
+              </a:defRPr>
+            </a:lvl2pPr>
+            <a:lvl3pPr marL="914400" indent="0" algn="l" defTabSz="457200" rtl="0" eaLnBrk="1" latinLnBrk="0" hangingPunct="1">
+              <a:spcBef>
+                <a:spcPct val="20000"/>
+              </a:spcBef>
+              <a:spcAft>
+                <a:spcPts val="600"/>
+              </a:spcAft>
+              <a:buClr>
+                <a:schemeClr val="accent2"/>
+              </a:buClr>
+              <a:buSzPct val="92000"/>
+              <a:buFont typeface="Wingdings 2" panose="05020102010507070707" pitchFamily="18" charset="2"/>
+              <a:buNone/>
+              <a:defRPr sz="1000" kern="1200">
+                <a:solidFill>
+                  <a:schemeClr val="tx2"/>
+                </a:solidFill>
+                <a:latin typeface="+mn-lt"/>
+                <a:ea typeface="+mn-ea"/>
+                <a:cs typeface="+mn-cs"/>
+              </a:defRPr>
+            </a:lvl3pPr>
+            <a:lvl4pPr marL="1371600" indent="0" algn="l" defTabSz="457200" rtl="0" eaLnBrk="1" latinLnBrk="0" hangingPunct="1">
+              <a:spcBef>
+                <a:spcPct val="20000"/>
+              </a:spcBef>
+              <a:spcAft>
+                <a:spcPts val="600"/>
+              </a:spcAft>
+              <a:buClr>
+                <a:schemeClr val="accent2"/>
+              </a:buClr>
+              <a:buSzPct val="92000"/>
+              <a:buFont typeface="Wingdings 2" panose="05020102010507070707" pitchFamily="18" charset="2"/>
+              <a:buNone/>
+              <a:defRPr sz="900" kern="1200">
+                <a:solidFill>
+                  <a:schemeClr val="tx2"/>
+                </a:solidFill>
+                <a:latin typeface="+mn-lt"/>
+                <a:ea typeface="+mn-ea"/>
+                <a:cs typeface="+mn-cs"/>
+              </a:defRPr>
+            </a:lvl4pPr>
+            <a:lvl5pPr marL="1828800" indent="0" algn="l" defTabSz="457200" rtl="0" eaLnBrk="1" latinLnBrk="0" hangingPunct="1">
+              <a:spcBef>
+                <a:spcPct val="20000"/>
+              </a:spcBef>
+              <a:spcAft>
+                <a:spcPts val="600"/>
+              </a:spcAft>
+              <a:buClr>
+                <a:schemeClr val="accent2"/>
+              </a:buClr>
+              <a:buSzPct val="92000"/>
+              <a:buFont typeface="Wingdings 2" panose="05020102010507070707" pitchFamily="18" charset="2"/>
+              <a:buNone/>
+              <a:defRPr sz="900" kern="1200">
+                <a:solidFill>
+                  <a:schemeClr val="tx2"/>
+                </a:solidFill>
+                <a:latin typeface="+mn-lt"/>
+                <a:ea typeface="+mn-ea"/>
+                <a:cs typeface="+mn-cs"/>
+              </a:defRPr>
+            </a:lvl5pPr>
+            <a:lvl6pPr marL="2286000" indent="0" algn="l" defTabSz="457200" rtl="0" eaLnBrk="1" latinLnBrk="0" hangingPunct="1">
+              <a:spcBef>
+                <a:spcPct val="20000"/>
+              </a:spcBef>
+              <a:spcAft>
+                <a:spcPts val="600"/>
+              </a:spcAft>
+              <a:buClr>
+                <a:schemeClr val="accent2"/>
+              </a:buClr>
+              <a:buSzPct val="92000"/>
+              <a:buFont typeface="Wingdings 2" panose="05020102010507070707" pitchFamily="18" charset="2"/>
+              <a:buNone/>
+              <a:defRPr sz="900" kern="1200">
+                <a:solidFill>
+                  <a:schemeClr val="tx2"/>
+                </a:solidFill>
+                <a:latin typeface="+mn-lt"/>
+                <a:ea typeface="+mn-ea"/>
+                <a:cs typeface="+mn-cs"/>
+              </a:defRPr>
+            </a:lvl6pPr>
+            <a:lvl7pPr marL="2743200" indent="0" algn="l" defTabSz="457200" rtl="0" eaLnBrk="1" latinLnBrk="0" hangingPunct="1">
+              <a:spcBef>
+                <a:spcPct val="20000"/>
+              </a:spcBef>
+              <a:spcAft>
+                <a:spcPts val="600"/>
+              </a:spcAft>
+              <a:buClr>
+                <a:schemeClr val="accent2"/>
+              </a:buClr>
+              <a:buSzPct val="92000"/>
+              <a:buFont typeface="Wingdings 2" panose="05020102010507070707" pitchFamily="18" charset="2"/>
+              <a:buNone/>
+              <a:defRPr sz="900" kern="1200">
+                <a:solidFill>
+                  <a:schemeClr val="tx2"/>
+                </a:solidFill>
+                <a:latin typeface="+mn-lt"/>
+                <a:ea typeface="+mn-ea"/>
+                <a:cs typeface="+mn-cs"/>
+              </a:defRPr>
+            </a:lvl7pPr>
+            <a:lvl8pPr marL="3200400" indent="0" algn="l" defTabSz="457200" rtl="0" eaLnBrk="1" latinLnBrk="0" hangingPunct="1">
+              <a:spcBef>
+                <a:spcPct val="20000"/>
+              </a:spcBef>
+              <a:spcAft>
+                <a:spcPts val="600"/>
+              </a:spcAft>
+              <a:buClr>
+                <a:schemeClr val="accent2"/>
+              </a:buClr>
+              <a:buSzPct val="92000"/>
+              <a:buFont typeface="Wingdings 2" panose="05020102010507070707" pitchFamily="18" charset="2"/>
+              <a:buNone/>
+              <a:defRPr sz="900" kern="1200">
+                <a:solidFill>
+                  <a:schemeClr val="tx2"/>
+                </a:solidFill>
+                <a:latin typeface="+mn-lt"/>
+                <a:ea typeface="+mn-ea"/>
+                <a:cs typeface="+mn-cs"/>
+              </a:defRPr>
+            </a:lvl8pPr>
+            <a:lvl9pPr marL="3657600" indent="0" algn="l" defTabSz="457200" rtl="0" eaLnBrk="1" latinLnBrk="0" hangingPunct="1">
+              <a:spcBef>
+                <a:spcPct val="20000"/>
+              </a:spcBef>
+              <a:spcAft>
+                <a:spcPts val="600"/>
+              </a:spcAft>
+              <a:buClr>
+                <a:schemeClr val="accent2"/>
+              </a:buClr>
+              <a:buSzPct val="92000"/>
+              <a:buFont typeface="Wingdings 2" panose="05020102010507070707" pitchFamily="18" charset="2"/>
+              <a:buNone/>
+              <a:defRPr sz="900" kern="1200">
+                <a:solidFill>
+                  <a:schemeClr val="tx2"/>
+                </a:solidFill>
+                <a:latin typeface="+mn-lt"/>
+                <a:ea typeface="+mn-ea"/>
+                <a:cs typeface="+mn-cs"/>
+              </a:defRPr>
+            </a:lvl9pPr>
+          </a:lstStyle>
+          <a:p>
+            <a:r>
+              <a:rPr lang="en-US" sz="2400" b="1" dirty="0"/>
+              <a:t>answers?</a:t>
+            </a:r>
+          </a:p>
+        </p:txBody>
+      </p:sp>
     </p:spTree>
     <p:extLst>
       <p:ext uri="{BB962C8B-B14F-4D97-AF65-F5344CB8AC3E}">
@@ -6191,11 +6626,7 @@
                                           </p:stCondLst>
                                         </p:cTn>
                                         <p:tgtEl>
-                                          <p:spTgt spid="6">
-                                            <p:txEl>
-                                              <p:pRg st="0" end="0"/>
-                                            </p:txEl>
-                                          </p:spTgt>
+                                          <p:spTgt spid="13"/>
                                         </p:tgtEl>
                                         <p:attrNameLst>
                                           <p:attrName>style.visibility</p:attrName>
@@ -6227,7 +6658,7 @@
                             </p:stCondLst>
                             <p:childTnLst>
                               <p:par>
-                                <p:cTn id="9" presetID="10" presetClass="entr" presetSubtype="0" fill="hold" nodeType="clickEffect">
+                                <p:cTn id="9" presetID="1" presetClass="entr" presetSubtype="0" fill="hold" nodeType="clickEffect">
                                   <p:stCondLst>
                                     <p:cond delay="0"/>
                                   </p:stCondLst>
@@ -6250,14 +6681,6 @@
                                         <p:strVal val="visible"/>
                                       </p:to>
                                     </p:set>
-                                    <p:animEffect transition="in" filter="fade">
-                                      <p:cBhvr>
-                                        <p:cTn id="11" dur="500"/>
-                                        <p:tgtEl>
-                                          <p:spTgt spid="8"/>
-                                        </p:tgtEl>
-                                      </p:cBhvr>
-                                    </p:animEffect>
                                   </p:childTnLst>
                                 </p:cTn>
                               </p:par>
@@ -6268,36 +6691,32 @@
                     </p:cTn>
                   </p:par>
                   <p:par>
-                    <p:cTn id="12" fill="hold">
+                    <p:cTn id="11" fill="hold">
                       <p:stCondLst>
                         <p:cond delay="indefinite"/>
                       </p:stCondLst>
                       <p:childTnLst>
                         <p:par>
-                          <p:cTn id="13" fill="hold">
+                          <p:cTn id="12" fill="hold">
                             <p:stCondLst>
                               <p:cond delay="0"/>
                             </p:stCondLst>
                             <p:childTnLst>
                               <p:par>
-                                <p:cTn id="14" presetID="1" presetClass="exit" presetSubtype="0" fill="hold" grpId="1" nodeType="clickEffect">
+                                <p:cTn id="13" presetID="1" presetClass="exit" presetSubtype="0" fill="hold" grpId="1" nodeType="clickEffect">
                                   <p:stCondLst>
                                     <p:cond delay="0"/>
                                   </p:stCondLst>
                                   <p:childTnLst>
                                     <p:set>
                                       <p:cBhvr>
-                                        <p:cTn id="15" dur="1" fill="hold">
+                                        <p:cTn id="14" dur="1" fill="hold">
                                           <p:stCondLst>
                                             <p:cond delay="0"/>
                                           </p:stCondLst>
                                         </p:cTn>
                                         <p:tgtEl>
-                                          <p:spTgt spid="6">
-                                            <p:txEl>
-                                              <p:pRg st="0" end="0"/>
-                                            </p:txEl>
-                                          </p:spTgt>
+                                          <p:spTgt spid="13"/>
                                         </p:tgtEl>
                                         <p:attrNameLst>
                                           <p:attrName>style.visibility</p:attrName>
@@ -6310,39 +6729,21 @@
                                   </p:childTnLst>
                                 </p:cTn>
                               </p:par>
-                            </p:childTnLst>
-                          </p:cTn>
-                        </p:par>
-                      </p:childTnLst>
-                    </p:cTn>
-                  </p:par>
-                  <p:par>
-                    <p:cTn id="16" fill="hold">
-                      <p:stCondLst>
-                        <p:cond delay="indefinite"/>
-                      </p:stCondLst>
-                      <p:childTnLst>
-                        <p:par>
-                          <p:cTn id="17" fill="hold">
-                            <p:stCondLst>
-                              <p:cond delay="0"/>
-                            </p:stCondLst>
-                            <p:childTnLst>
                               <p:par>
-                                <p:cTn id="18" presetID="1" presetClass="entr" presetSubtype="0" fill="hold" grpId="0" nodeType="clickEffect">
+                                <p:cTn id="15" presetID="1" presetClass="entr" presetSubtype="0" fill="hold" grpId="0" nodeType="withEffect">
                                   <p:stCondLst>
                                     <p:cond delay="0"/>
                                   </p:stCondLst>
                                   <p:childTnLst>
                                     <p:set>
                                       <p:cBhvr>
-                                        <p:cTn id="19" dur="1" fill="hold">
+                                        <p:cTn id="16" dur="1" fill="hold">
                                           <p:stCondLst>
                                             <p:cond delay="0"/>
                                           </p:stCondLst>
                                         </p:cTn>
                                         <p:tgtEl>
-                                          <p:spTgt spid="9"/>
+                                          <p:spTgt spid="11"/>
                                         </p:tgtEl>
                                         <p:attrNameLst>
                                           <p:attrName>style.visibility</p:attrName>
@@ -6362,130 +6763,32 @@
                     </p:cTn>
                   </p:par>
                   <p:par>
-                    <p:cTn id="20" fill="hold">
+                    <p:cTn id="17" fill="hold">
                       <p:stCondLst>
                         <p:cond delay="indefinite"/>
                       </p:stCondLst>
                       <p:childTnLst>
                         <p:par>
-                          <p:cTn id="21" fill="hold">
+                          <p:cTn id="18" fill="hold">
                             <p:stCondLst>
                               <p:cond delay="0"/>
                             </p:stCondLst>
                             <p:childTnLst>
                               <p:par>
-                                <p:cTn id="22" presetID="10" presetClass="entr" presetSubtype="0" fill="hold" nodeType="clickEffect">
+                                <p:cTn id="19" presetID="1" presetClass="entr" presetSubtype="0" fill="hold" nodeType="clickEffect">
                                   <p:stCondLst>
                                     <p:cond delay="0"/>
                                   </p:stCondLst>
                                   <p:childTnLst>
                                     <p:set>
                                       <p:cBhvr>
-                                        <p:cTn id="23" dur="1" fill="hold">
+                                        <p:cTn id="20" dur="1" fill="hold">
                                           <p:stCondLst>
                                             <p:cond delay="0"/>
                                           </p:stCondLst>
                                         </p:cTn>
                                         <p:tgtEl>
                                           <p:spTgt spid="12"/>
-                                        </p:tgtEl>
-                                        <p:attrNameLst>
-                                          <p:attrName>style.visibility</p:attrName>
-                                        </p:attrNameLst>
-                                      </p:cBhvr>
-                                      <p:to>
-                                        <p:strVal val="visible"/>
-                                      </p:to>
-                                    </p:set>
-                                    <p:animEffect transition="in" filter="fade">
-                                      <p:cBhvr>
-                                        <p:cTn id="24" dur="500"/>
-                                        <p:tgtEl>
-                                          <p:spTgt spid="12"/>
-                                        </p:tgtEl>
-                                      </p:cBhvr>
-                                    </p:animEffect>
-                                  </p:childTnLst>
-                                </p:cTn>
-                              </p:par>
-                            </p:childTnLst>
-                          </p:cTn>
-                        </p:par>
-                      </p:childTnLst>
-                    </p:cTn>
-                  </p:par>
-                  <p:par>
-                    <p:cTn id="25" fill="hold">
-                      <p:stCondLst>
-                        <p:cond delay="indefinite"/>
-                      </p:stCondLst>
-                      <p:childTnLst>
-                        <p:par>
-                          <p:cTn id="26" fill="hold">
-                            <p:stCondLst>
-                              <p:cond delay="0"/>
-                            </p:stCondLst>
-                            <p:childTnLst>
-                              <p:par>
-                                <p:cTn id="27" presetID="1" presetClass="exit" presetSubtype="0" fill="hold" grpId="1" nodeType="clickEffect">
-                                  <p:stCondLst>
-                                    <p:cond delay="0"/>
-                                  </p:stCondLst>
-                                  <p:childTnLst>
-                                    <p:set>
-                                      <p:cBhvr>
-                                        <p:cTn id="28" dur="1" fill="hold">
-                                          <p:stCondLst>
-                                            <p:cond delay="0"/>
-                                          </p:stCondLst>
-                                        </p:cTn>
-                                        <p:tgtEl>
-                                          <p:spTgt spid="9"/>
-                                        </p:tgtEl>
-                                        <p:attrNameLst>
-                                          <p:attrName>style.visibility</p:attrName>
-                                        </p:attrNameLst>
-                                      </p:cBhvr>
-                                      <p:to>
-                                        <p:strVal val="hidden"/>
-                                      </p:to>
-                                    </p:set>
-                                  </p:childTnLst>
-                                </p:cTn>
-                              </p:par>
-                            </p:childTnLst>
-                          </p:cTn>
-                        </p:par>
-                      </p:childTnLst>
-                    </p:cTn>
-                  </p:par>
-                  <p:par>
-                    <p:cTn id="29" fill="hold">
-                      <p:stCondLst>
-                        <p:cond delay="indefinite"/>
-                      </p:stCondLst>
-                      <p:childTnLst>
-                        <p:par>
-                          <p:cTn id="30" fill="hold">
-                            <p:stCondLst>
-                              <p:cond delay="0"/>
-                            </p:stCondLst>
-                            <p:childTnLst>
-                              <p:par>
-                                <p:cTn id="31" presetID="1" presetClass="entr" presetSubtype="0" fill="hold" grpId="0" nodeType="clickEffect">
-                                  <p:stCondLst>
-                                    <p:cond delay="0"/>
-                                  </p:stCondLst>
-                                  <p:childTnLst>
-                                    <p:set>
-                                      <p:cBhvr>
-                                        <p:cTn id="32" dur="1" fill="hold">
-                                          <p:stCondLst>
-                                            <p:cond delay="0"/>
-                                          </p:stCondLst>
-                                        </p:cTn>
-                                        <p:tgtEl>
-                                          <p:spTgt spid="10"/>
                                         </p:tgtEl>
                                         <p:attrNameLst>
                                           <p:attrName>style.visibility</p:attrName>
@@ -6505,26 +6808,98 @@
                     </p:cTn>
                   </p:par>
                   <p:par>
-                    <p:cTn id="33" fill="hold">
+                    <p:cTn id="21" fill="hold">
                       <p:stCondLst>
                         <p:cond delay="indefinite"/>
                       </p:stCondLst>
                       <p:childTnLst>
                         <p:par>
-                          <p:cTn id="34" fill="hold">
+                          <p:cTn id="22" fill="hold">
                             <p:stCondLst>
                               <p:cond delay="0"/>
                             </p:stCondLst>
                             <p:childTnLst>
                               <p:par>
-                                <p:cTn id="35" presetID="10" presetClass="entr" presetSubtype="0" fill="hold" nodeType="clickEffect">
+                                <p:cTn id="23" presetID="1" presetClass="exit" presetSubtype="0" fill="hold" grpId="1" nodeType="clickEffect">
                                   <p:stCondLst>
                                     <p:cond delay="0"/>
                                   </p:stCondLst>
                                   <p:childTnLst>
                                     <p:set>
                                       <p:cBhvr>
-                                        <p:cTn id="36" dur="1" fill="hold">
+                                        <p:cTn id="24" dur="1" fill="hold">
+                                          <p:stCondLst>
+                                            <p:cond delay="0"/>
+                                          </p:stCondLst>
+                                        </p:cTn>
+                                        <p:tgtEl>
+                                          <p:spTgt spid="11"/>
+                                        </p:tgtEl>
+                                        <p:attrNameLst>
+                                          <p:attrName>style.visibility</p:attrName>
+                                        </p:attrNameLst>
+                                      </p:cBhvr>
+                                      <p:to>
+                                        <p:strVal val="hidden"/>
+                                      </p:to>
+                                    </p:set>
+                                  </p:childTnLst>
+                                </p:cTn>
+                              </p:par>
+                              <p:par>
+                                <p:cTn id="25" presetID="1" presetClass="entr" presetSubtype="0" fill="hold" grpId="0" nodeType="withEffect">
+                                  <p:stCondLst>
+                                    <p:cond delay="0"/>
+                                  </p:stCondLst>
+                                  <p:childTnLst>
+                                    <p:set>
+                                      <p:cBhvr>
+                                        <p:cTn id="26" dur="1" fill="hold">
+                                          <p:stCondLst>
+                                            <p:cond delay="0"/>
+                                          </p:stCondLst>
+                                        </p:cTn>
+                                        <p:tgtEl>
+                                          <p:spTgt spid="15"/>
+                                        </p:tgtEl>
+                                        <p:attrNameLst>
+                                          <p:attrName>style.visibility</p:attrName>
+                                        </p:attrNameLst>
+                                      </p:cBhvr>
+                                      <p:to>
+                                        <p:strVal val="visible"/>
+                                      </p:to>
+                                    </p:set>
+                                  </p:childTnLst>
+                                </p:cTn>
+                              </p:par>
+                            </p:childTnLst>
+                          </p:cTn>
+                        </p:par>
+                      </p:childTnLst>
+                    </p:cTn>
+                  </p:par>
+                  <p:par>
+                    <p:cTn id="27" fill="hold">
+                      <p:stCondLst>
+                        <p:cond delay="indefinite"/>
+                      </p:stCondLst>
+                      <p:childTnLst>
+                        <p:par>
+                          <p:cTn id="28" fill="hold">
+                            <p:stCondLst>
+                              <p:cond delay="0"/>
+                            </p:stCondLst>
+                            <p:childTnLst>
+                              <p:par>
+                                <p:cTn id="29" presetID="1" presetClass="entr" presetSubtype="0" fill="hold" nodeType="clickEffect">
+                                  <p:stCondLst>
+                                    <p:cond delay="0"/>
+                                  </p:stCondLst>
+                                  <p:childTnLst>
+                                    <p:set>
+                                      <p:cBhvr>
+                                        <p:cTn id="30" dur="1" fill="hold">
                                           <p:stCondLst>
                                             <p:cond delay="0"/>
                                           </p:stCondLst>
@@ -6540,14 +6915,6 @@
                                         <p:strVal val="visible"/>
                                       </p:to>
                                     </p:set>
-                                    <p:animEffect transition="in" filter="fade">
-                                      <p:cBhvr>
-                                        <p:cTn id="37" dur="500"/>
-                                        <p:tgtEl>
-                                          <p:spTgt spid="14"/>
-                                        </p:tgtEl>
-                                      </p:cBhvr>
-                                    </p:animEffect>
                                   </p:childTnLst>
                                 </p:cTn>
                               </p:par>
@@ -6579,11 +6946,11 @@
       </p:par>
     </p:tnLst>
     <p:bldLst>
-      <p:bldP spid="6" grpId="0" build="p"/>
-      <p:bldP spid="6" grpId="1" build="p"/>
-      <p:bldP spid="9" grpId="0"/>
-      <p:bldP spid="9" grpId="1"/>
-      <p:bldP spid="10" grpId="0"/>
+      <p:bldP spid="11" grpId="0"/>
+      <p:bldP spid="11" grpId="1"/>
+      <p:bldP spid="13" grpId="0"/>
+      <p:bldP spid="13" grpId="1"/>
+      <p:bldP spid="15" grpId="0"/>
     </p:bldLst>
   </p:timing>
 </p:sld>

</xml_diff>

<commit_message>
updated presentation after run through
</commit_message>
<xml_diff>
--- a/docs/Analyzing_Jeopardy_Data.pptx
+++ b/docs/Analyzing_Jeopardy_Data.pptx
@@ -373,7 +373,7 @@
           <a:p>
             <a:fld id="{1160EA64-D806-43AC-9DF2-F8C432F32B4C}" type="datetimeFigureOut">
               <a:rPr lang="en-US" smtClean="0"/>
-              <a:t>4/4/2021</a:t>
+              <a:t>4/5/21</a:t>
             </a:fld>
             <a:endParaRPr lang="en-US" dirty="0"/>
           </a:p>
@@ -636,7 +636,7 @@
           <a:p>
             <a:fld id="{E9F9C37B-1D36-470B-8223-D6C91242EC14}" type="datetimeFigureOut">
               <a:rPr lang="en-US" smtClean="0"/>
-              <a:t>4/4/2021</a:t>
+              <a:t>4/5/21</a:t>
             </a:fld>
             <a:endParaRPr lang="en-US" dirty="0"/>
           </a:p>
@@ -871,7 +871,7 @@
           <a:p>
             <a:fld id="{67C6F52A-A82B-47A2-A83A-8C4C91F2D59F}" type="datetimeFigureOut">
               <a:rPr lang="en-US" smtClean="0"/>
-              <a:t>4/4/2021</a:t>
+              <a:t>4/5/21</a:t>
             </a:fld>
             <a:endParaRPr lang="en-US" dirty="0"/>
           </a:p>
@@ -1111,7 +1111,7 @@
           <a:p>
             <a:fld id="{F070A7B3-6521-4DCA-87E5-044747A908C1}" type="datetimeFigureOut">
               <a:rPr lang="en-US" smtClean="0"/>
-              <a:t>4/4/2021</a:t>
+              <a:t>4/5/21</a:t>
             </a:fld>
             <a:endParaRPr lang="en-US" dirty="0"/>
           </a:p>
@@ -1419,7 +1419,7 @@
           <a:p>
             <a:fld id="{1160EA64-D806-43AC-9DF2-F8C432F32B4C}" type="datetimeFigureOut">
               <a:rPr lang="en-US" smtClean="0"/>
-              <a:t>4/4/2021</a:t>
+              <a:t>4/5/21</a:t>
             </a:fld>
             <a:endParaRPr lang="en-US" dirty="0"/>
           </a:p>
@@ -1722,7 +1722,7 @@
           <a:p>
             <a:fld id="{AB134690-1557-4C89-A502-4959FE7FAD70}" type="datetimeFigureOut">
               <a:rPr lang="en-US" smtClean="0"/>
-              <a:t>4/4/2021</a:t>
+              <a:t>4/5/21</a:t>
             </a:fld>
             <a:endParaRPr lang="en-US" dirty="0"/>
           </a:p>
@@ -2144,7 +2144,7 @@
           <a:p>
             <a:fld id="{1160EA64-D806-43AC-9DF2-F8C432F32B4C}" type="datetimeFigureOut">
               <a:rPr lang="en-US" smtClean="0"/>
-              <a:t>4/4/2021</a:t>
+              <a:t>4/5/21</a:t>
             </a:fld>
             <a:endParaRPr lang="en-US" dirty="0"/>
           </a:p>
@@ -2241,7 +2241,7 @@
           <a:p>
             <a:fld id="{E1037C31-9E7A-4F99-8774-A0E530DE1A42}" type="datetimeFigureOut">
               <a:rPr lang="en-US" smtClean="0"/>
-              <a:t>4/4/2021</a:t>
+              <a:t>4/5/21</a:t>
             </a:fld>
             <a:endParaRPr lang="en-US" dirty="0"/>
           </a:p>
@@ -2403,7 +2403,7 @@
           <a:p>
             <a:fld id="{C278504F-A551-4DE0-9316-4DCD1D8CC752}" type="datetimeFigureOut">
               <a:rPr lang="en-US" smtClean="0"/>
-              <a:t>4/4/2021</a:t>
+              <a:t>4/5/21</a:t>
             </a:fld>
             <a:endParaRPr lang="en-US" dirty="0"/>
           </a:p>
@@ -2781,7 +2781,7 @@
           <a:p>
             <a:fld id="{1160EA64-D806-43AC-9DF2-F8C432F32B4C}" type="datetimeFigureOut">
               <a:rPr lang="en-US" smtClean="0"/>
-              <a:t>4/4/2021</a:t>
+              <a:t>4/5/21</a:t>
             </a:fld>
             <a:endParaRPr lang="en-US" dirty="0"/>
           </a:p>
@@ -3072,7 +3072,7 @@
             <a:fld id="{1160EA64-D806-43AC-9DF2-F8C432F32B4C}" type="datetimeFigureOut">
               <a:rPr lang="en-US" smtClean="0"/>
               <a:pPr/>
-              <a:t>4/4/2021</a:t>
+              <a:t>4/5/21</a:t>
             </a:fld>
             <a:endParaRPr lang="en-US" dirty="0"/>
           </a:p>
@@ -3284,7 +3284,7 @@
           <a:p>
             <a:fld id="{1160EA64-D806-43AC-9DF2-F8C432F32B4C}" type="datetimeFigureOut">
               <a:rPr lang="en-US" smtClean="0"/>
-              <a:t>4/4/2021</a:t>
+              <a:t>4/5/21</a:t>
             </a:fld>
             <a:endParaRPr lang="en-US" dirty="0"/>
           </a:p>
@@ -4193,7 +4193,7 @@
         <p:spPr>
           <a:xfrm>
             <a:off x="8317076" y="668740"/>
-            <a:ext cx="3147043" cy="4926841"/>
+            <a:ext cx="3293733" cy="4926841"/>
           </a:xfrm>
         </p:spPr>
         <p:txBody>
@@ -4203,13 +4203,38 @@
           <a:lstStyle/>
           <a:p>
             <a:r>
-              <a:rPr lang="en-US" sz="4400">
+              <a:rPr lang="en-US" sz="4000" dirty="0">
                 <a:solidFill>
                   <a:srgbClr val="FFFFFF"/>
                 </a:solidFill>
               </a:rPr>
-              <a:t>M. Ball, M. Farrow, J. Harrison</a:t>
-            </a:r>
+              <a:t>M. Ball, </a:t>
+            </a:r>
+          </a:p>
+          <a:p>
+            <a:r>
+              <a:rPr lang="en-US" sz="4000" dirty="0">
+                <a:solidFill>
+                  <a:srgbClr val="FFFFFF"/>
+                </a:solidFill>
+              </a:rPr>
+              <a:t>M. Farrow, </a:t>
+            </a:r>
+          </a:p>
+          <a:p>
+            <a:r>
+              <a:rPr lang="en-US" sz="4000" dirty="0">
+                <a:solidFill>
+                  <a:srgbClr val="FFFFFF"/>
+                </a:solidFill>
+              </a:rPr>
+              <a:t>J. Harrison</a:t>
+            </a:r>
+            <a:endParaRPr lang="en-US" sz="4400" dirty="0">
+              <a:solidFill>
+                <a:srgbClr val="FFFFFF"/>
+              </a:solidFill>
+            </a:endParaRPr>
           </a:p>
         </p:txBody>
       </p:sp>
@@ -7027,9 +7052,10 @@
           <a:lstStyle/>
           <a:p>
             <a:r>
-              <a:rPr lang="en-US" dirty="0"/>
-              <a:t>*add link here</a:t>
-            </a:r>
+              <a:rPr lang="en-US" dirty="0" err="1"/>
+              <a:t>Jeopardy.site</a:t>
+            </a:r>
+            <a:endParaRPr lang="en-US" dirty="0"/>
           </a:p>
         </p:txBody>
       </p:sp>
@@ -7120,21 +7146,13 @@
           <a:p>
             <a:r>
               <a:rPr lang="en-US" dirty="0"/>
-              <a:t>Although the data base is not all that large, an area for future development could be to host the database on the cloud so that you would not have to store it locally to access the data. This would allow us to then…</a:t>
+              <a:t>Although the database is not all that large, an area for future development could be to host the database on the cloud so that you would not have to store it locally to access the data. This would allow us to then…</a:t>
             </a:r>
           </a:p>
           <a:p>
             <a:r>
               <a:rPr lang="en-US" dirty="0"/>
-              <a:t>Recreate each game into an interactive app for people to play and to practice for a future appearance on </a:t>
-            </a:r>
-            <a:r>
-              <a:rPr lang="en-US" dirty="0" err="1"/>
-              <a:t>eopardy</a:t>
-            </a:r>
-            <a:r>
-              <a:rPr lang="en-US" dirty="0"/>
-              <a:t>!</a:t>
+              <a:t>Recreate each game into an interactive app for people to play and to practice for a future appearance on Jeopardy!</a:t>
             </a:r>
           </a:p>
           <a:p>
@@ -7355,15 +7373,33 @@
                                   </p:childTnLst>
                                 </p:cTn>
                               </p:par>
+                            </p:childTnLst>
+                          </p:cTn>
+                        </p:par>
+                      </p:childTnLst>
+                    </p:cTn>
+                  </p:par>
+                  <p:par>
+                    <p:cTn id="18" fill="hold">
+                      <p:stCondLst>
+                        <p:cond delay="indefinite"/>
+                      </p:stCondLst>
+                      <p:childTnLst>
+                        <p:par>
+                          <p:cTn id="19" fill="hold">
+                            <p:stCondLst>
+                              <p:cond delay="0"/>
+                            </p:stCondLst>
+                            <p:childTnLst>
                               <p:par>
-                                <p:cTn id="18" presetID="10" presetClass="entr" presetSubtype="0" fill="hold" grpId="0" nodeType="withEffect">
+                                <p:cTn id="20" presetID="10" presetClass="entr" presetSubtype="0" fill="hold" grpId="0" nodeType="clickEffect">
                                   <p:stCondLst>
                                     <p:cond delay="0"/>
                                   </p:stCondLst>
                                   <p:childTnLst>
                                     <p:set>
                                       <p:cBhvr>
-                                        <p:cTn id="19" dur="1" fill="hold">
+                                        <p:cTn id="21" dur="1" fill="hold">
                                           <p:stCondLst>
                                             <p:cond delay="0"/>
                                           </p:stCondLst>
@@ -7385,7 +7421,7 @@
                                     </p:set>
                                     <p:animEffect transition="in" filter="fade">
                                       <p:cBhvr>
-                                        <p:cTn id="20" dur="500"/>
+                                        <p:cTn id="22" dur="500"/>
                                         <p:tgtEl>
                                           <p:spTgt spid="5">
                                             <p:txEl>
@@ -7426,7 +7462,7 @@
       </p:par>
     </p:tnLst>
     <p:bldLst>
-      <p:bldP spid="5" grpId="0" build="p"/>
+      <p:bldP spid="5" grpId="0" uiExpand="1" build="p"/>
     </p:bldLst>
   </p:timing>
 </p:sld>

</xml_diff>

<commit_message>
two small grammatical changes to intro slide
</commit_message>
<xml_diff>
--- a/docs/Analyzing_Jeopardy_Data.pptx
+++ b/docs/Analyzing_Jeopardy_Data.pptx
@@ -374,7 +374,7 @@
           <a:p>
             <a:fld id="{1160EA64-D806-43AC-9DF2-F8C432F32B4C}" type="datetimeFigureOut">
               <a:rPr lang="en-US" smtClean="0"/>
-              <a:t>4/7/2021</a:t>
+              <a:t>4/8/21</a:t>
             </a:fld>
             <a:endParaRPr lang="en-US" dirty="0"/>
           </a:p>
@@ -637,7 +637,7 @@
           <a:p>
             <a:fld id="{E9F9C37B-1D36-470B-8223-D6C91242EC14}" type="datetimeFigureOut">
               <a:rPr lang="en-US" smtClean="0"/>
-              <a:t>4/7/2021</a:t>
+              <a:t>4/8/21</a:t>
             </a:fld>
             <a:endParaRPr lang="en-US" dirty="0"/>
           </a:p>
@@ -872,7 +872,7 @@
           <a:p>
             <a:fld id="{67C6F52A-A82B-47A2-A83A-8C4C91F2D59F}" type="datetimeFigureOut">
               <a:rPr lang="en-US" smtClean="0"/>
-              <a:t>4/7/2021</a:t>
+              <a:t>4/8/21</a:t>
             </a:fld>
             <a:endParaRPr lang="en-US" dirty="0"/>
           </a:p>
@@ -1112,7 +1112,7 @@
           <a:p>
             <a:fld id="{F070A7B3-6521-4DCA-87E5-044747A908C1}" type="datetimeFigureOut">
               <a:rPr lang="en-US" smtClean="0"/>
-              <a:t>4/7/2021</a:t>
+              <a:t>4/8/21</a:t>
             </a:fld>
             <a:endParaRPr lang="en-US" dirty="0"/>
           </a:p>
@@ -1420,7 +1420,7 @@
           <a:p>
             <a:fld id="{1160EA64-D806-43AC-9DF2-F8C432F32B4C}" type="datetimeFigureOut">
               <a:rPr lang="en-US" smtClean="0"/>
-              <a:t>4/7/2021</a:t>
+              <a:t>4/8/21</a:t>
             </a:fld>
             <a:endParaRPr lang="en-US" dirty="0"/>
           </a:p>
@@ -1723,7 +1723,7 @@
           <a:p>
             <a:fld id="{AB134690-1557-4C89-A502-4959FE7FAD70}" type="datetimeFigureOut">
               <a:rPr lang="en-US" smtClean="0"/>
-              <a:t>4/7/2021</a:t>
+              <a:t>4/8/21</a:t>
             </a:fld>
             <a:endParaRPr lang="en-US" dirty="0"/>
           </a:p>
@@ -2145,7 +2145,7 @@
           <a:p>
             <a:fld id="{1160EA64-D806-43AC-9DF2-F8C432F32B4C}" type="datetimeFigureOut">
               <a:rPr lang="en-US" smtClean="0"/>
-              <a:t>4/7/2021</a:t>
+              <a:t>4/8/21</a:t>
             </a:fld>
             <a:endParaRPr lang="en-US" dirty="0"/>
           </a:p>
@@ -2242,7 +2242,7 @@
           <a:p>
             <a:fld id="{E1037C31-9E7A-4F99-8774-A0E530DE1A42}" type="datetimeFigureOut">
               <a:rPr lang="en-US" smtClean="0"/>
-              <a:t>4/7/2021</a:t>
+              <a:t>4/8/21</a:t>
             </a:fld>
             <a:endParaRPr lang="en-US" dirty="0"/>
           </a:p>
@@ -2404,7 +2404,7 @@
           <a:p>
             <a:fld id="{C278504F-A551-4DE0-9316-4DCD1D8CC752}" type="datetimeFigureOut">
               <a:rPr lang="en-US" smtClean="0"/>
-              <a:t>4/7/2021</a:t>
+              <a:t>4/8/21</a:t>
             </a:fld>
             <a:endParaRPr lang="en-US" dirty="0"/>
           </a:p>
@@ -2782,7 +2782,7 @@
           <a:p>
             <a:fld id="{1160EA64-D806-43AC-9DF2-F8C432F32B4C}" type="datetimeFigureOut">
               <a:rPr lang="en-US" smtClean="0"/>
-              <a:t>4/7/2021</a:t>
+              <a:t>4/8/21</a:t>
             </a:fld>
             <a:endParaRPr lang="en-US" dirty="0"/>
           </a:p>
@@ -3073,7 +3073,7 @@
             <a:fld id="{1160EA64-D806-43AC-9DF2-F8C432F32B4C}" type="datetimeFigureOut">
               <a:rPr lang="en-US" smtClean="0"/>
               <a:pPr/>
-              <a:t>4/7/2021</a:t>
+              <a:t>4/8/21</a:t>
             </a:fld>
             <a:endParaRPr lang="en-US" dirty="0"/>
           </a:p>
@@ -3285,7 +3285,7 @@
           <a:p>
             <a:fld id="{1160EA64-D806-43AC-9DF2-F8C432F32B4C}" type="datetimeFigureOut">
               <a:rPr lang="en-US" smtClean="0"/>
-              <a:t>4/7/2021</a:t>
+              <a:t>4/8/21</a:t>
             </a:fld>
             <a:endParaRPr lang="en-US" dirty="0"/>
           </a:p>
@@ -3944,7 +3944,7 @@
                 <a:latin typeface="HeiT" panose="020B0502000000000001" pitchFamily="34" charset="-120"/>
                 <a:ea typeface="HeiT" panose="020B0502000000000001" pitchFamily="34" charset="-120"/>
               </a:rPr>
-              <a:t>This game show that has been on the air for more than 37 years and is known for its late, beloved host and having players answer clues in the form of a question?</a:t>
+              <a:t>This game show has been on the air for more than 37 years and is known for its late, beloved host and having players answer clues in the form of a question</a:t>
             </a:r>
           </a:p>
         </p:txBody>

</xml_diff>